<commit_message>
this is a checkpoint, revert back to here if needed
</commit_message>
<xml_diff>
--- a/test_results/pipeline_output/committee_deck.pptx
+++ b/test_results/pipeline_output/committee_deck.pptx
@@ -15,8 +15,11 @@
     <p:sldId id="263" r:id="rId14"/>
     <p:sldId id="264" r:id="rId15"/>
     <p:sldId id="265" r:id="rId16"/>
+    <p:sldId id="266" r:id="rId17"/>
+    <p:sldId id="267" r:id="rId18"/>
+    <p:sldId id="268" r:id="rId19"/>
   </p:sldIdLst>
-  <p:sldSz cx="9144000" cy="6858000" type="screen4x3"/>
+  <p:sldSz cx="12191695" cy="6858000" type="screen4x3"/>
   <p:notesSz cx="6858000" cy="9144000"/>
   <p:defaultTextStyle>
     <a:defPPr>
@@ -114,6 +117,449 @@
     </a:lvl9pPr>
   </p:defaultTextStyle>
 </p:presentation>
+</file>
+
+<file path=ppt/charts/chart1.xml><?xml version="1.0" encoding="utf-8"?>
+<c:chartSpace xmlns:c="http://schemas.openxmlformats.org/drawingml/2006/chart" xmlns:a="http://schemas.openxmlformats.org/drawingml/2006/main" xmlns:r="http://schemas.openxmlformats.org/officeDocument/2006/relationships">
+  <c:date1904 val="0"/>
+  <c:chart>
+    <c:autoTitleDeleted val="0"/>
+    <c:plotArea>
+      <c:barChart>
+        <c:barDir val="col"/>
+        <c:grouping val="clustered"/>
+        <c:ser>
+          <c:idx val="0"/>
+          <c:order val="0"/>
+          <c:tx>
+            <c:strRef>
+              <c:f>Sheet1!$B$1</c:f>
+              <c:strCache>
+                <c:ptCount val="1"/>
+                <c:pt idx="0">
+                  <c:v>Revenue (Rm)</c:v>
+                </c:pt>
+              </c:strCache>
+            </c:strRef>
+          </c:tx>
+          <c:cat>
+            <c:strRef>
+              <c:f>Sheet1!$A$2:$A$4</c:f>
+              <c:strCache>
+                <c:ptCount val="3"/>
+                <c:pt idx="0">
+                  <c:v>2023-06</c:v>
+                </c:pt>
+                <c:pt idx="1">
+                  <c:v>2024-06</c:v>
+                </c:pt>
+                <c:pt idx="2">
+                  <c:v>2025-06</c:v>
+                </c:pt>
+              </c:strCache>
+            </c:strRef>
+          </c:cat>
+          <c:val>
+            <c:numRef>
+              <c:f>Sheet1!$B$2:$B$4</c:f>
+              <c:numCache>
+                <c:formatCode>General</c:formatCode>
+                <c:ptCount val="3"/>
+                <c:pt idx="0">
+                  <c:v>214956.0</c:v>
+                </c:pt>
+                <c:pt idx="1">
+                  <c:v>232088.0</c:v>
+                </c:pt>
+                <c:pt idx="2">
+                  <c:v>252701.0</c:v>
+                </c:pt>
+              </c:numCache>
+            </c:numRef>
+          </c:val>
+        </c:ser>
+        <c:ser>
+          <c:idx val="1"/>
+          <c:order val="1"/>
+          <c:tx>
+            <c:strRef>
+              <c:f>Sheet1!$C$1</c:f>
+              <c:strCache>
+                <c:ptCount val="1"/>
+                <c:pt idx="0">
+                  <c:v>EBITDA (Rm)</c:v>
+                </c:pt>
+              </c:strCache>
+            </c:strRef>
+          </c:tx>
+          <c:cat>
+            <c:strRef>
+              <c:f>Sheet1!$A$2:$A$4</c:f>
+              <c:strCache>
+                <c:ptCount val="3"/>
+                <c:pt idx="0">
+                  <c:v>2023-06</c:v>
+                </c:pt>
+                <c:pt idx="1">
+                  <c:v>2024-06</c:v>
+                </c:pt>
+                <c:pt idx="2">
+                  <c:v>2025-06</c:v>
+                </c:pt>
+              </c:strCache>
+            </c:strRef>
+          </c:cat>
+          <c:val>
+            <c:numRef>
+              <c:f>Sheet1!$C$2:$C$4</c:f>
+              <c:numCache>
+                <c:formatCode>General</c:formatCode>
+                <c:ptCount val="3"/>
+                <c:pt idx="0">
+                  <c:v>6042.0</c:v>
+                </c:pt>
+                <c:pt idx="1">
+                  <c:v>5817.0</c:v>
+                </c:pt>
+                <c:pt idx="2">
+                  <c:v>6931.0</c:v>
+                </c:pt>
+              </c:numCache>
+            </c:numRef>
+          </c:val>
+        </c:ser>
+        <c:axId val="-2068027336"/>
+        <c:axId val="-2113994440"/>
+      </c:barChart>
+      <c:catAx>
+        <c:axId val="-2068027336"/>
+        <c:scaling>
+          <c:orientation val="minMax"/>
+        </c:scaling>
+        <c:delete val="0"/>
+        <c:axPos val="b"/>
+        <c:majorTickMark val="out"/>
+        <c:minorTickMark val="none"/>
+        <c:tickLblPos val="nextTo"/>
+        <c:crossAx val="-2113994440"/>
+        <c:crosses val="autoZero"/>
+        <c:auto val="1"/>
+        <c:lblAlgn val="ctr"/>
+        <c:lblOffset val="100"/>
+        <c:noMultiLvlLbl val="0"/>
+      </c:catAx>
+      <c:valAx>
+        <c:axId val="-2113994440"/>
+        <c:scaling/>
+        <c:delete val="0"/>
+        <c:axPos val="l"/>
+        <c:majorGridlines/>
+        <c:majorTickMark val="out"/>
+        <c:minorTickMark val="none"/>
+        <c:tickLblPos val="nextTo"/>
+        <c:crossAx val="-2068027336"/>
+        <c:crosses val="autoZero"/>
+      </c:valAx>
+    </c:plotArea>
+    <c:dispBlanksAs val="gap"/>
+  </c:chart>
+  <c:txPr>
+    <a:bodyPr/>
+    <a:lstStyle/>
+    <a:p>
+      <a:pPr>
+        <a:defRPr sz="1800"/>
+      </a:pPr>
+      <a:endParaRPr lang="en-US"/>
+    </a:p>
+  </c:txPr>
+  <c:externalData r:id="rId1">
+    <c:autoUpdate val="0"/>
+  </c:externalData>
+</c:chartSpace>
+</file>
+
+<file path=ppt/charts/chart2.xml><?xml version="1.0" encoding="utf-8"?>
+<c:chartSpace xmlns:c="http://schemas.openxmlformats.org/drawingml/2006/chart" xmlns:a="http://schemas.openxmlformats.org/drawingml/2006/main" xmlns:r="http://schemas.openxmlformats.org/officeDocument/2006/relationships">
+  <c:date1904 val="0"/>
+  <c:chart>
+    <c:autoTitleDeleted val="0"/>
+    <c:plotArea>
+      <c:lineChart>
+        <c:grouping val="standard"/>
+        <c:varyColors val="0"/>
+        <c:ser>
+          <c:idx val="0"/>
+          <c:order val="0"/>
+          <c:tx>
+            <c:strRef>
+              <c:f>Sheet1!$B$1</c:f>
+              <c:strCache>
+                <c:ptCount val="1"/>
+                <c:pt idx="0">
+                  <c:v>ND/EBITDA (x)</c:v>
+                </c:pt>
+              </c:strCache>
+            </c:strRef>
+          </c:tx>
+          <c:marker>
+            <c:symbol val="none"/>
+          </c:marker>
+          <c:cat>
+            <c:strRef>
+              <c:f>Sheet1!$A$2:$A$4</c:f>
+              <c:strCache>
+                <c:ptCount val="3"/>
+                <c:pt idx="0">
+                  <c:v>2023-06</c:v>
+                </c:pt>
+                <c:pt idx="1">
+                  <c:v>2024-06</c:v>
+                </c:pt>
+                <c:pt idx="2">
+                  <c:v>2025-06</c:v>
+                </c:pt>
+              </c:strCache>
+            </c:strRef>
+          </c:cat>
+          <c:val>
+            <c:numRef>
+              <c:f>Sheet1!$B$2:$B$4</c:f>
+              <c:numCache>
+                <c:formatCode>General</c:formatCode>
+                <c:ptCount val="3"/>
+                <c:pt idx="0">
+                  <c:v>4.3922542204568025</c:v>
+                </c:pt>
+                <c:pt idx="1">
+                  <c:v>4.790269898573148</c:v>
+                </c:pt>
+                <c:pt idx="2">
+                  <c:v>5.054537584764104</c:v>
+                </c:pt>
+              </c:numCache>
+            </c:numRef>
+          </c:val>
+          <c:smooth val="0"/>
+        </c:ser>
+        <c:marker val="1"/>
+        <c:smooth val="0"/>
+        <c:axId val="2118791784"/>
+        <c:axId val="2140495176"/>
+      </c:lineChart>
+      <c:catAx>
+        <c:axId val="2118791784"/>
+        <c:scaling>
+          <c:orientation val="minMax"/>
+        </c:scaling>
+        <c:delete val="0"/>
+        <c:axPos val="b"/>
+        <c:majorTickMark val="out"/>
+        <c:minorTickMark val="none"/>
+        <c:tickLblPos val="nextTo"/>
+        <c:crossAx val="2140495176"/>
+        <c:crosses val="autoZero"/>
+        <c:auto val="1"/>
+        <c:lblAlgn val="ctr"/>
+        <c:lblOffset val="100"/>
+        <c:noMultiLvlLbl val="0"/>
+      </c:catAx>
+      <c:valAx>
+        <c:axId val="2140495176"/>
+        <c:scaling/>
+        <c:delete val="0"/>
+        <c:axPos val="l"/>
+        <c:majorGridlines/>
+        <c:majorTickMark val="out"/>
+        <c:minorTickMark val="none"/>
+        <c:tickLblPos val="nextTo"/>
+        <c:crossAx val="2118791784"/>
+        <c:crosses val="autoZero"/>
+      </c:valAx>
+    </c:plotArea>
+    <c:legend>
+      <c:legendPos val="r"/>
+      <c:layout/>
+      <c:overlay val="0"/>
+    </c:legend>
+    <c:plotVisOnly val="1"/>
+    <c:dispBlanksAs val="gap"/>
+    <c:showDLblsOverMax val="0"/>
+  </c:chart>
+  <c:txPr>
+    <a:bodyPr/>
+    <a:lstStyle/>
+    <a:p>
+      <a:pPr>
+        <a:defRPr sz="1800"/>
+      </a:pPr>
+      <a:endParaRPr lang="en-US"/>
+    </a:p>
+  </c:txPr>
+  <c:externalData r:id="rId1">
+    <c:autoUpdate val="0"/>
+  </c:externalData>
+</c:chartSpace>
+</file>
+
+<file path=ppt/charts/chart3.xml><?xml version="1.0" encoding="utf-8"?>
+<c:chartSpace xmlns:c="http://schemas.openxmlformats.org/drawingml/2006/chart" xmlns:a="http://schemas.openxmlformats.org/drawingml/2006/main" xmlns:r="http://schemas.openxmlformats.org/officeDocument/2006/relationships">
+  <c:date1904 val="0"/>
+  <c:chart>
+    <c:autoTitleDeleted val="0"/>
+    <c:plotArea>
+      <c:barChart>
+        <c:barDir val="col"/>
+        <c:grouping val="clustered"/>
+        <c:ser>
+          <c:idx val="0"/>
+          <c:order val="0"/>
+          <c:tx>
+            <c:strRef>
+              <c:f>Sheet1!$B$1</c:f>
+              <c:strCache>
+                <c:ptCount val="1"/>
+                <c:pt idx="0">
+                  <c:v>Net CFO (Rm)</c:v>
+                </c:pt>
+              </c:strCache>
+            </c:strRef>
+          </c:tx>
+          <c:cat>
+            <c:strRef>
+              <c:f>Sheet1!$A$2:$A$4</c:f>
+              <c:strCache>
+                <c:ptCount val="3"/>
+                <c:pt idx="0">
+                  <c:v>2023-06</c:v>
+                </c:pt>
+                <c:pt idx="1">
+                  <c:v>2024-06</c:v>
+                </c:pt>
+                <c:pt idx="2">
+                  <c:v>2025-06</c:v>
+                </c:pt>
+              </c:strCache>
+            </c:strRef>
+          </c:cat>
+          <c:val>
+            <c:numRef>
+              <c:f>Sheet1!$B$2:$B$4</c:f>
+              <c:numCache>
+                <c:formatCode>General</c:formatCode>
+                <c:ptCount val="3"/>
+                <c:pt idx="0">
+                  <c:v>9831.0</c:v>
+                </c:pt>
+                <c:pt idx="1">
+                  <c:v>13841.0</c:v>
+                </c:pt>
+                <c:pt idx="2">
+                  <c:v>10984.0</c:v>
+                </c:pt>
+              </c:numCache>
+            </c:numRef>
+          </c:val>
+        </c:ser>
+        <c:ser>
+          <c:idx val="1"/>
+          <c:order val="1"/>
+          <c:tx>
+            <c:strRef>
+              <c:f>Sheet1!$C$1</c:f>
+              <c:strCache>
+                <c:ptCount val="1"/>
+                <c:pt idx="0">
+                  <c:v>Capex (Rm)</c:v>
+                </c:pt>
+              </c:strCache>
+            </c:strRef>
+          </c:tx>
+          <c:cat>
+            <c:strRef>
+              <c:f>Sheet1!$A$2:$A$4</c:f>
+              <c:strCache>
+                <c:ptCount val="3"/>
+                <c:pt idx="0">
+                  <c:v>2023-06</c:v>
+                </c:pt>
+                <c:pt idx="1">
+                  <c:v>2024-06</c:v>
+                </c:pt>
+                <c:pt idx="2">
+                  <c:v>2025-06</c:v>
+                </c:pt>
+              </c:strCache>
+            </c:strRef>
+          </c:cat>
+          <c:val>
+            <c:numRef>
+              <c:f>Sheet1!$C$2:$C$4</c:f>
+              <c:numCache>
+                <c:formatCode>General</c:formatCode>
+                <c:ptCount val="3"/>
+                <c:pt idx="0">
+                  <c:v>4594.0</c:v>
+                </c:pt>
+                <c:pt idx="1">
+                  <c:v>5718.0</c:v>
+                </c:pt>
+                <c:pt idx="2">
+                  <c:v>6320.0</c:v>
+                </c:pt>
+              </c:numCache>
+            </c:numRef>
+          </c:val>
+        </c:ser>
+        <c:axId val="-2068027336"/>
+        <c:axId val="-2113994440"/>
+      </c:barChart>
+      <c:catAx>
+        <c:axId val="-2068027336"/>
+        <c:scaling>
+          <c:orientation val="minMax"/>
+        </c:scaling>
+        <c:delete val="0"/>
+        <c:axPos val="b"/>
+        <c:majorTickMark val="out"/>
+        <c:minorTickMark val="none"/>
+        <c:tickLblPos val="nextTo"/>
+        <c:crossAx val="-2113994440"/>
+        <c:crosses val="autoZero"/>
+        <c:auto val="1"/>
+        <c:lblAlgn val="ctr"/>
+        <c:lblOffset val="100"/>
+        <c:noMultiLvlLbl val="0"/>
+      </c:catAx>
+      <c:valAx>
+        <c:axId val="-2113994440"/>
+        <c:scaling/>
+        <c:delete val="0"/>
+        <c:axPos val="l"/>
+        <c:majorGridlines/>
+        <c:majorTickMark val="out"/>
+        <c:minorTickMark val="none"/>
+        <c:tickLblPos val="nextTo"/>
+        <c:crossAx val="-2068027336"/>
+        <c:crosses val="autoZero"/>
+      </c:valAx>
+    </c:plotArea>
+    <c:dispBlanksAs val="gap"/>
+  </c:chart>
+  <c:txPr>
+    <a:bodyPr/>
+    <a:lstStyle/>
+    <a:p>
+      <a:pPr>
+        <a:defRPr sz="1800"/>
+      </a:pPr>
+      <a:endParaRPr lang="en-US"/>
+    </a:p>
+  </c:txPr>
+  <c:externalData r:id="rId1">
+    <c:autoUpdate val="0"/>
+  </c:externalData>
+</c:chartSpace>
 </file>
 
 <file path=ppt/slideLayouts/slideLayout1.xml><?xml version="1.0" encoding="utf-8"?>
@@ -3099,42 +3545,70 @@
       <p:grpSpPr/>
       <p:sp>
         <p:nvSpPr>
-          <p:cNvPr id="2" name="Title 1"/>
-          <p:cNvSpPr>
-            <a:spLocks noGrp="1"/>
-          </p:cNvSpPr>
-          <p:nvPr>
-            <p:ph type="ctrTitle"/>
-          </p:nvPr>
-        </p:nvSpPr>
-        <p:spPr/>
-        <p:txBody>
-          <a:bodyPr/>
-          <a:lstStyle/>
-          <a:p>
-            <a:r>
-              <a:t>Credit Committee — Sample (Pty) Ltd</a:t>
-            </a:r>
-          </a:p>
-        </p:txBody>
-      </p:sp>
-      <p:sp>
-        <p:nvSpPr>
-          <p:cNvPr id="3" name="Subtitle 2"/>
-          <p:cNvSpPr>
-            <a:spLocks noGrp="1"/>
-          </p:cNvSpPr>
-          <p:nvPr>
-            <p:ph type="subTitle" idx="1"/>
-          </p:nvPr>
-        </p:nvSpPr>
-        <p:spPr/>
-        <p:txBody>
-          <a:bodyPr/>
-          <a:lstStyle/>
-          <a:p>
-            <a:r>
-              <a:t>Rating: BBB | Recommendation: Maintain | 802b55d6-8499-424a-ad8f-85fcf124d550</a:t>
+          <p:cNvPr id="2" name="TextBox 1"/>
+          <p:cNvSpPr txBox="1"/>
+          <p:nvPr/>
+        </p:nvSpPr>
+        <p:spPr>
+          <a:xfrm>
+            <a:off x="457200" y="2011680"/>
+            <a:ext cx="11247120" cy="1097280"/>
+          </a:xfrm>
+          <a:prstGeom prst="rect">
+            <a:avLst/>
+          </a:prstGeom>
+          <a:noFill/>
+        </p:spPr>
+        <p:txBody>
+          <a:bodyPr wrap="none">
+            <a:spAutoFit/>
+          </a:bodyPr>
+          <a:lstStyle/>
+          <a:p>
+            <a:pPr>
+              <a:defRPr sz="4000" b="1">
+                <a:solidFill>
+                  <a:srgbClr val="1F4E79"/>
+                </a:solidFill>
+              </a:defRPr>
+            </a:pPr>
+            <a:r>
+              <a:t>Credit Committee</a:t>
+            </a:r>
+          </a:p>
+        </p:txBody>
+      </p:sp>
+      <p:sp>
+        <p:nvSpPr>
+          <p:cNvPr id="3" name="TextBox 2"/>
+          <p:cNvSpPr txBox="1"/>
+          <p:nvPr/>
+        </p:nvSpPr>
+        <p:spPr>
+          <a:xfrm>
+            <a:off x="457200" y="3291840"/>
+            <a:ext cx="11247120" cy="914400"/>
+          </a:xfrm>
+          <a:prstGeom prst="rect">
+            <a:avLst/>
+          </a:prstGeom>
+          <a:noFill/>
+        </p:spPr>
+        <p:txBody>
+          <a:bodyPr wrap="none">
+            <a:spAutoFit/>
+          </a:bodyPr>
+          <a:lstStyle/>
+          <a:p>
+            <a:pPr>
+              <a:defRPr sz="1800">
+                <a:solidFill>
+                  <a:srgbClr val="2E75B6"/>
+                </a:solidFill>
+              </a:defRPr>
+            </a:pPr>
+            <a:r>
+              <a:t>Sample (Pty) Ltd  •  Rating: BBB  •  Recommendation: Caution  •  v0aca3bd4</a:t>
             </a:r>
           </a:p>
         </p:txBody>
@@ -3159,42 +3633,736 @@
       <p:grpSpPr/>
       <p:sp>
         <p:nvSpPr>
-          <p:cNvPr id="2" name="Title 1"/>
-          <p:cNvSpPr>
-            <a:spLocks noGrp="1"/>
-          </p:cNvSpPr>
-          <p:nvPr>
-            <p:ph type="title"/>
-          </p:nvPr>
-        </p:nvSpPr>
-        <p:spPr/>
-        <p:txBody>
-          <a:bodyPr/>
-          <a:lstStyle/>
-          <a:p>
-            <a:r>
-              <a:t>Appendix</a:t>
-            </a:r>
-          </a:p>
-        </p:txBody>
-      </p:sp>
-      <p:sp>
-        <p:nvSpPr>
-          <p:cNvPr id="3" name="Content Placeholder 2"/>
-          <p:cNvSpPr>
-            <a:spLocks noGrp="1"/>
-          </p:cNvSpPr>
-          <p:nvPr>
-            <p:ph idx="1"/>
-          </p:nvPr>
-        </p:nvSpPr>
-        <p:spPr/>
-        <p:txBody>
-          <a:bodyPr/>
-          <a:lstStyle/>
-          <a:p>
-            <a:r>
-              <a:t>Supporting schedules and exhibits.</a:t>
+          <p:cNvPr id="2" name="Rectangle 1"/>
+          <p:cNvSpPr/>
+          <p:nvPr/>
+        </p:nvSpPr>
+        <p:spPr>
+          <a:xfrm>
+            <a:off x="0" y="0"/>
+            <a:ext cx="12191695" cy="1097280"/>
+          </a:xfrm>
+          <a:prstGeom prst="rect">
+            <a:avLst/>
+          </a:prstGeom>
+          <a:solidFill>
+            <a:srgbClr val="1F4E79"/>
+          </a:solidFill>
+          <a:ln>
+            <a:noFill/>
+          </a:ln>
+        </p:spPr>
+        <p:style>
+          <a:lnRef idx="1">
+            <a:schemeClr val="accent1"/>
+          </a:lnRef>
+          <a:fillRef idx="3">
+            <a:schemeClr val="accent1"/>
+          </a:fillRef>
+          <a:effectRef idx="2">
+            <a:schemeClr val="accent1"/>
+          </a:effectRef>
+          <a:fontRef idx="minor">
+            <a:schemeClr val="lt1"/>
+          </a:fontRef>
+        </p:style>
+        <p:txBody>
+          <a:bodyPr rtlCol="0" anchor="ctr"/>
+          <a:lstStyle/>
+          <a:p>
+            <a:pPr algn="ctr"/>
+          </a:p>
+        </p:txBody>
+      </p:sp>
+      <p:sp>
+        <p:nvSpPr>
+          <p:cNvPr id="3" name="TextBox 2"/>
+          <p:cNvSpPr txBox="1"/>
+          <p:nvPr/>
+        </p:nvSpPr>
+        <p:spPr>
+          <a:xfrm>
+            <a:off x="457200" y="228600"/>
+            <a:ext cx="10972800" cy="731520"/>
+          </a:xfrm>
+          <a:prstGeom prst="rect">
+            <a:avLst/>
+          </a:prstGeom>
+          <a:noFill/>
+        </p:spPr>
+        <p:txBody>
+          <a:bodyPr wrap="none">
+            <a:spAutoFit/>
+          </a:bodyPr>
+          <a:lstStyle/>
+          <a:p>
+            <a:pPr>
+              <a:defRPr sz="2800" b="1">
+                <a:solidFill>
+                  <a:srgbClr val="FFFFFF"/>
+                </a:solidFill>
+              </a:defRPr>
+            </a:pPr>
+            <a:r>
+              <a:t>Stress Testing Results</a:t>
+            </a:r>
+          </a:p>
+        </p:txBody>
+      </p:sp>
+      <p:sp>
+        <p:nvSpPr>
+          <p:cNvPr id="4" name="TextBox 3"/>
+          <p:cNvSpPr txBox="1"/>
+          <p:nvPr/>
+        </p:nvSpPr>
+        <p:spPr>
+          <a:xfrm>
+            <a:off x="548640" y="1371600"/>
+            <a:ext cx="10972800" cy="5029200"/>
+          </a:xfrm>
+          <a:prstGeom prst="rect">
+            <a:avLst/>
+          </a:prstGeom>
+          <a:noFill/>
+        </p:spPr>
+        <p:txBody>
+          <a:bodyPr wrap="square">
+            <a:spAutoFit/>
+          </a:bodyPr>
+          <a:lstStyle/>
+          <a:p>
+            <a:pPr>
+              <a:spcAft>
+                <a:spcPts val="800"/>
+              </a:spcAft>
+              <a:defRPr sz="1400"/>
+            </a:pPr>
+            <a:r>
+              <a:t>A_revenue_minus_10pct: Interest cover 2.63x ND/EBITDA 5.62x</a:t>
+            </a:r>
+          </a:p>
+          <a:p>
+            <a:pPr>
+              <a:spcAft>
+                <a:spcPts val="800"/>
+              </a:spcAft>
+              <a:defRPr sz="1400"/>
+            </a:pPr>
+            <a:r>
+              <a:t>B_interest_plus_200bps: Interest cover 2.90x</a:t>
+            </a:r>
+          </a:p>
+          <a:p>
+            <a:pPr>
+              <a:spcAft>
+                <a:spcPts val="800"/>
+              </a:spcAft>
+              <a:defRPr sz="1400"/>
+            </a:pPr>
+            <a:r>
+              <a:t>C_working_capital_shock: Cash after shock: -15,324.10</a:t>
+            </a:r>
+          </a:p>
+          <a:p>
+            <a:pPr>
+              <a:spcAft>
+                <a:spcPts val="800"/>
+              </a:spcAft>
+              <a:defRPr sz="1400"/>
+            </a:pPr>
+            <a:r>
+              <a:t>D_margin_compression_200bps: Interest cover 0.79x ND/EBITDA 18.66x</a:t>
+            </a:r>
+          </a:p>
+          <a:p>
+            <a:pPr>
+              <a:spcAft>
+                <a:spcPts val="800"/>
+              </a:spcAft>
+              <a:defRPr sz="1400"/>
+            </a:pPr>
+            <a:r>
+              <a:t>E_combined: Interest cover 2.61x ND/EBITDA 5.62x</a:t>
+            </a:r>
+          </a:p>
+        </p:txBody>
+      </p:sp>
+      <p:sp>
+        <p:nvSpPr>
+          <p:cNvPr id="5" name="TextBox 4"/>
+          <p:cNvSpPr txBox="1"/>
+          <p:nvPr/>
+        </p:nvSpPr>
+        <p:spPr>
+          <a:xfrm>
+            <a:off x="548640" y="5303520"/>
+            <a:ext cx="10972800" cy="731520"/>
+          </a:xfrm>
+          <a:prstGeom prst="rect">
+            <a:avLst/>
+          </a:prstGeom>
+          <a:noFill/>
+        </p:spPr>
+        <p:txBody>
+          <a:bodyPr wrap="none">
+            <a:spAutoFit/>
+          </a:bodyPr>
+          <a:lstStyle/>
+          <a:p>
+            <a:pPr>
+              <a:defRPr sz="1200" i="1">
+                <a:solidFill>
+                  <a:srgbClr val="2E75B6"/>
+                </a:solidFill>
+              </a:defRPr>
+            </a:pPr>
+            <a:r>
+              <a:t>► Breaches under stress trigger governance notch downgrades.</a:t>
+            </a:r>
+          </a:p>
+        </p:txBody>
+      </p:sp>
+    </p:spTree>
+  </p:cSld>
+  <p:clrMapOvr>
+    <a:masterClrMapping/>
+  </p:clrMapOvr>
+</p:sld>
+</file>
+
+<file path=ppt/slides/slide11.xml><?xml version="1.0" encoding="utf-8"?>
+<p:sld xmlns:a="http://schemas.openxmlformats.org/drawingml/2006/main" xmlns:p="http://schemas.openxmlformats.org/presentationml/2006/main" xmlns:r="http://schemas.openxmlformats.org/officeDocument/2006/relationships">
+  <p:cSld>
+    <p:spTree>
+      <p:nvGrpSpPr>
+        <p:cNvPr id="1" name=""/>
+        <p:cNvGrpSpPr/>
+        <p:nvPr/>
+      </p:nvGrpSpPr>
+      <p:grpSpPr/>
+      <p:sp>
+        <p:nvSpPr>
+          <p:cNvPr id="2" name="Rectangle 1"/>
+          <p:cNvSpPr/>
+          <p:nvPr/>
+        </p:nvSpPr>
+        <p:spPr>
+          <a:xfrm>
+            <a:off x="0" y="0"/>
+            <a:ext cx="12191695" cy="1097280"/>
+          </a:xfrm>
+          <a:prstGeom prst="rect">
+            <a:avLst/>
+          </a:prstGeom>
+          <a:solidFill>
+            <a:srgbClr val="1F4E79"/>
+          </a:solidFill>
+          <a:ln>
+            <a:noFill/>
+          </a:ln>
+        </p:spPr>
+        <p:style>
+          <a:lnRef idx="1">
+            <a:schemeClr val="accent1"/>
+          </a:lnRef>
+          <a:fillRef idx="3">
+            <a:schemeClr val="accent1"/>
+          </a:fillRef>
+          <a:effectRef idx="2">
+            <a:schemeClr val="accent1"/>
+          </a:effectRef>
+          <a:fontRef idx="minor">
+            <a:schemeClr val="lt1"/>
+          </a:fontRef>
+        </p:style>
+        <p:txBody>
+          <a:bodyPr rtlCol="0" anchor="ctr"/>
+          <a:lstStyle/>
+          <a:p>
+            <a:pPr algn="ctr"/>
+          </a:p>
+        </p:txBody>
+      </p:sp>
+      <p:sp>
+        <p:nvSpPr>
+          <p:cNvPr id="3" name="TextBox 2"/>
+          <p:cNvSpPr txBox="1"/>
+          <p:nvPr/>
+        </p:nvSpPr>
+        <p:spPr>
+          <a:xfrm>
+            <a:off x="457200" y="228600"/>
+            <a:ext cx="10972800" cy="731520"/>
+          </a:xfrm>
+          <a:prstGeom prst="rect">
+            <a:avLst/>
+          </a:prstGeom>
+          <a:noFill/>
+        </p:spPr>
+        <p:txBody>
+          <a:bodyPr wrap="none">
+            <a:spAutoFit/>
+          </a:bodyPr>
+          <a:lstStyle/>
+          <a:p>
+            <a:pPr>
+              <a:defRPr sz="2800" b="1">
+                <a:solidFill>
+                  <a:srgbClr val="FFFFFF"/>
+                </a:solidFill>
+              </a:defRPr>
+            </a:pPr>
+            <a:r>
+              <a:t>Covenants &amp; Headroom</a:t>
+            </a:r>
+          </a:p>
+        </p:txBody>
+      </p:sp>
+      <p:sp>
+        <p:nvSpPr>
+          <p:cNvPr id="4" name="TextBox 3"/>
+          <p:cNvSpPr txBox="1"/>
+          <p:nvPr/>
+        </p:nvSpPr>
+        <p:spPr>
+          <a:xfrm>
+            <a:off x="548640" y="1371600"/>
+            <a:ext cx="10972800" cy="5029200"/>
+          </a:xfrm>
+          <a:prstGeom prst="rect">
+            <a:avLst/>
+          </a:prstGeom>
+          <a:noFill/>
+        </p:spPr>
+        <p:txBody>
+          <a:bodyPr wrap="square">
+            <a:spAutoFit/>
+          </a:bodyPr>
+          <a:lstStyle/>
+          <a:p>
+            <a:pPr>
+              <a:spcAft>
+                <a:spcPts val="800"/>
+              </a:spcAft>
+              <a:defRPr sz="1400"/>
+            </a:pPr>
+            <a:r>
+              <a:t>Covenants &amp; Headroom — Score: 10.0/100, Rating: Weak</a:t>
+            </a:r>
+          </a:p>
+          <a:p>
+            <a:pPr>
+              <a:spcAft>
+                <a:spcPts val="800"/>
+              </a:spcAft>
+              <a:defRPr sz="1400"/>
+            </a:pPr>
+          </a:p>
+          <a:p>
+            <a:pPr>
+              <a:spcAft>
+                <a:spcPts val="800"/>
+              </a:spcAft>
+              <a:defRPr sz="1400"/>
+            </a:pPr>
+            <a:r>
+              <a:t>Covenant terms: max leverage 2.8x, min interest cover 3.5x.  Current metrics indicate covenant breach.</a:t>
+            </a:r>
+          </a:p>
+          <a:p>
+            <a:pPr>
+              <a:spcAft>
+                <a:spcPts val="800"/>
+              </a:spcAft>
+              <a:defRPr sz="1400"/>
+            </a:pPr>
+          </a:p>
+          <a:p>
+            <a:pPr>
+              <a:spcAft>
+                <a:spcPts val="800"/>
+              </a:spcAft>
+              <a:defRPr sz="1400"/>
+            </a:pPr>
+            <a:r>
+              <a:t>Leverage headroom: -83.6% to covenant limit.  Interest cover headroom: -61.7%.</a:t>
+            </a:r>
+          </a:p>
+          <a:p>
+            <a:pPr>
+              <a:spcAft>
+                <a:spcPts val="800"/>
+              </a:spcAft>
+              <a:defRPr sz="1400"/>
+            </a:pPr>
+          </a:p>
+          <a:p>
+            <a:pPr>
+              <a:spcAft>
+                <a:spcPts val="800"/>
+              </a:spcAft>
+              <a:defRPr sz="1400"/>
+            </a:pPr>
+            <a:r>
+              <a:t>Breach triggers rating cap under governance (max BB-).</a:t>
+            </a:r>
+          </a:p>
+          <a:p>
+            <a:pPr>
+              <a:spcAft>
+                <a:spcPts val="800"/>
+              </a:spcAft>
+              <a:defRPr sz="1400"/>
+            </a:pPr>
+          </a:p>
+          <a:p>
+            <a:pPr>
+              <a:spcAft>
+                <a:spcPts val="800"/>
+              </a:spcAft>
+              <a:defRPr sz="1400"/>
+            </a:pPr>
+            <a:r>
+              <a:t>Refer to Note 48 (borrowings) and Note 43.4.3 for covenant terms and cure rights.</a:t>
+            </a:r>
+          </a:p>
+          <a:p>
+            <a:pPr>
+              <a:spcAft>
+                <a:spcPts val="800"/>
+              </a:spcAft>
+              <a:defRPr sz="1400"/>
+            </a:pPr>
+          </a:p>
+          <a:p>
+            <a:pPr>
+              <a:spcAft>
+                <a:spcPts val="800"/>
+              </a:spcAft>
+              <a:defRPr sz="1400"/>
+            </a:pPr>
+            <a:r>
+              <a:t>Covenant headroom is weak and directly influences the final rating where breach applies.</a:t>
+            </a:r>
+          </a:p>
+          <a:p>
+            <a:pPr>
+              <a:spcAft>
+                <a:spcPts val="800"/>
+              </a:spcAft>
+              <a:defRPr sz="1400"/>
+            </a:pPr>
+          </a:p>
+          <a:p>
+            <a:pPr>
+              <a:spcAft>
+                <a:spcPts val="800"/>
+              </a:spcAft>
+              <a:defRPr sz="1400"/>
+            </a:pPr>
+            <a:r>
+              <a:t>Key metrics:</a:t>
+            </a:r>
+          </a:p>
+          <a:p>
+            <a:pPr>
+              <a:spcAft>
+                <a:spcPts val="800"/>
+              </a:spcAft>
+              <a:defRPr sz="1400"/>
+            </a:pPr>
+            <a:r>
+              <a:t>- Coverage Headroom Pct: -61.70</a:t>
+            </a:r>
+          </a:p>
+          <a:p>
+            <a:pPr>
+              <a:spcAft>
+                <a:spcPts val="800"/>
+              </a:spcAft>
+              <a:defRPr sz="1400"/>
+            </a:pPr>
+            <a:r>
+              <a:t>- Leverage Headroom Pct: -83.60</a:t>
+            </a:r>
+          </a:p>
+        </p:txBody>
+      </p:sp>
+    </p:spTree>
+  </p:cSld>
+  <p:clrMapOvr>
+    <a:masterClrMapping/>
+  </p:clrMapOvr>
+</p:sld>
+</file>
+
+<file path=ppt/slides/slide12.xml><?xml version="1.0" encoding="utf-8"?>
+<p:sld xmlns:a="http://schemas.openxmlformats.org/drawingml/2006/main" xmlns:p="http://schemas.openxmlformats.org/presentationml/2006/main" xmlns:r="http://schemas.openxmlformats.org/officeDocument/2006/relationships">
+  <p:cSld>
+    <p:spTree>
+      <p:nvGrpSpPr>
+        <p:cNvPr id="1" name=""/>
+        <p:cNvGrpSpPr/>
+        <p:nvPr/>
+      </p:nvGrpSpPr>
+      <p:grpSpPr/>
+      <p:sp>
+        <p:nvSpPr>
+          <p:cNvPr id="2" name="Rectangle 1"/>
+          <p:cNvSpPr/>
+          <p:nvPr/>
+        </p:nvSpPr>
+        <p:spPr>
+          <a:xfrm>
+            <a:off x="0" y="0"/>
+            <a:ext cx="12191695" cy="1097280"/>
+          </a:xfrm>
+          <a:prstGeom prst="rect">
+            <a:avLst/>
+          </a:prstGeom>
+          <a:solidFill>
+            <a:srgbClr val="1F4E79"/>
+          </a:solidFill>
+          <a:ln>
+            <a:noFill/>
+          </a:ln>
+        </p:spPr>
+        <p:style>
+          <a:lnRef idx="1">
+            <a:schemeClr val="accent1"/>
+          </a:lnRef>
+          <a:fillRef idx="3">
+            <a:schemeClr val="accent1"/>
+          </a:fillRef>
+          <a:effectRef idx="2">
+            <a:schemeClr val="accent1"/>
+          </a:effectRef>
+          <a:fontRef idx="minor">
+            <a:schemeClr val="lt1"/>
+          </a:fontRef>
+        </p:style>
+        <p:txBody>
+          <a:bodyPr rtlCol="0" anchor="ctr"/>
+          <a:lstStyle/>
+          <a:p>
+            <a:pPr algn="ctr"/>
+          </a:p>
+        </p:txBody>
+      </p:sp>
+      <p:sp>
+        <p:nvSpPr>
+          <p:cNvPr id="3" name="TextBox 2"/>
+          <p:cNvSpPr txBox="1"/>
+          <p:nvPr/>
+        </p:nvSpPr>
+        <p:spPr>
+          <a:xfrm>
+            <a:off x="457200" y="228600"/>
+            <a:ext cx="10972800" cy="731520"/>
+          </a:xfrm>
+          <a:prstGeom prst="rect">
+            <a:avLst/>
+          </a:prstGeom>
+          <a:noFill/>
+        </p:spPr>
+        <p:txBody>
+          <a:bodyPr wrap="none">
+            <a:spAutoFit/>
+          </a:bodyPr>
+          <a:lstStyle/>
+          <a:p>
+            <a:pPr>
+              <a:defRPr sz="2800" b="1">
+                <a:solidFill>
+                  <a:srgbClr val="FFFFFF"/>
+                </a:solidFill>
+              </a:defRPr>
+            </a:pPr>
+            <a:r>
+              <a:t>Internal Rating Rationale</a:t>
+            </a:r>
+          </a:p>
+        </p:txBody>
+      </p:sp>
+      <p:sp>
+        <p:nvSpPr>
+          <p:cNvPr id="4" name="TextBox 3"/>
+          <p:cNvSpPr txBox="1"/>
+          <p:nvPr/>
+        </p:nvSpPr>
+        <p:spPr>
+          <a:xfrm>
+            <a:off x="548640" y="1371600"/>
+            <a:ext cx="10972800" cy="5029200"/>
+          </a:xfrm>
+          <a:prstGeom prst="rect">
+            <a:avLst/>
+          </a:prstGeom>
+          <a:noFill/>
+        </p:spPr>
+        <p:txBody>
+          <a:bodyPr wrap="square">
+            <a:spAutoFit/>
+          </a:bodyPr>
+          <a:lstStyle/>
+          <a:p>
+            <a:pPr>
+              <a:spcAft>
+                <a:spcPts val="800"/>
+              </a:spcAft>
+              <a:defRPr sz="1400"/>
+            </a:pPr>
+            <a:r>
+              <a:t>Internal rating: BBB. Aggregate score: 48.1/100. Top positive drivers: Business Risk (Adequate), Financial Performanc...</a:t>
+            </a:r>
+          </a:p>
+        </p:txBody>
+      </p:sp>
+    </p:spTree>
+  </p:cSld>
+  <p:clrMapOvr>
+    <a:masterClrMapping/>
+  </p:clrMapOvr>
+</p:sld>
+</file>
+
+<file path=ppt/slides/slide13.xml><?xml version="1.0" encoding="utf-8"?>
+<p:sld xmlns:a="http://schemas.openxmlformats.org/drawingml/2006/main" xmlns:p="http://schemas.openxmlformats.org/presentationml/2006/main" xmlns:r="http://schemas.openxmlformats.org/officeDocument/2006/relationships">
+  <p:cSld>
+    <p:spTree>
+      <p:nvGrpSpPr>
+        <p:cNvPr id="1" name=""/>
+        <p:cNvGrpSpPr/>
+        <p:nvPr/>
+      </p:nvGrpSpPr>
+      <p:grpSpPr/>
+      <p:sp>
+        <p:nvSpPr>
+          <p:cNvPr id="2" name="Rectangle 1"/>
+          <p:cNvSpPr/>
+          <p:nvPr/>
+        </p:nvSpPr>
+        <p:spPr>
+          <a:xfrm>
+            <a:off x="0" y="0"/>
+            <a:ext cx="12191695" cy="1097280"/>
+          </a:xfrm>
+          <a:prstGeom prst="rect">
+            <a:avLst/>
+          </a:prstGeom>
+          <a:solidFill>
+            <a:srgbClr val="1F4E79"/>
+          </a:solidFill>
+          <a:ln>
+            <a:noFill/>
+          </a:ln>
+        </p:spPr>
+        <p:style>
+          <a:lnRef idx="1">
+            <a:schemeClr val="accent1"/>
+          </a:lnRef>
+          <a:fillRef idx="3">
+            <a:schemeClr val="accent1"/>
+          </a:fillRef>
+          <a:effectRef idx="2">
+            <a:schemeClr val="accent1"/>
+          </a:effectRef>
+          <a:fontRef idx="minor">
+            <a:schemeClr val="lt1"/>
+          </a:fontRef>
+        </p:style>
+        <p:txBody>
+          <a:bodyPr rtlCol="0" anchor="ctr"/>
+          <a:lstStyle/>
+          <a:p>
+            <a:pPr algn="ctr"/>
+          </a:p>
+        </p:txBody>
+      </p:sp>
+      <p:sp>
+        <p:nvSpPr>
+          <p:cNvPr id="3" name="TextBox 2"/>
+          <p:cNvSpPr txBox="1"/>
+          <p:nvPr/>
+        </p:nvSpPr>
+        <p:spPr>
+          <a:xfrm>
+            <a:off x="457200" y="228600"/>
+            <a:ext cx="10972800" cy="731520"/>
+          </a:xfrm>
+          <a:prstGeom prst="rect">
+            <a:avLst/>
+          </a:prstGeom>
+          <a:noFill/>
+        </p:spPr>
+        <p:txBody>
+          <a:bodyPr wrap="none">
+            <a:spAutoFit/>
+          </a:bodyPr>
+          <a:lstStyle/>
+          <a:p>
+            <a:pPr>
+              <a:defRPr sz="2800" b="1">
+                <a:solidFill>
+                  <a:srgbClr val="FFFFFF"/>
+                </a:solidFill>
+              </a:defRPr>
+            </a:pPr>
+            <a:r>
+              <a:t>Recommendation</a:t>
+            </a:r>
+          </a:p>
+        </p:txBody>
+      </p:sp>
+      <p:sp>
+        <p:nvSpPr>
+          <p:cNvPr id="4" name="TextBox 3"/>
+          <p:cNvSpPr txBox="1"/>
+          <p:nvPr/>
+        </p:nvSpPr>
+        <p:spPr>
+          <a:xfrm>
+            <a:off x="548640" y="1371600"/>
+            <a:ext cx="10972800" cy="5029200"/>
+          </a:xfrm>
+          <a:prstGeom prst="rect">
+            <a:avLst/>
+          </a:prstGeom>
+          <a:noFill/>
+        </p:spPr>
+        <p:txBody>
+          <a:bodyPr wrap="square">
+            <a:spAutoFit/>
+          </a:bodyPr>
+          <a:lstStyle/>
+          <a:p>
+            <a:pPr>
+              <a:spcAft>
+                <a:spcPts val="800"/>
+              </a:spcAft>
+              <a:defRPr sz="1400"/>
+            </a:pPr>
+            <a:r>
+              <a:t>Recommendation: Caution</a:t>
+            </a:r>
+          </a:p>
+          <a:p>
+            <a:pPr>
+              <a:spcAft>
+                <a:spcPts val="800"/>
+              </a:spcAft>
+              <a:defRPr sz="1400"/>
+            </a:pPr>
+          </a:p>
+          <a:p>
+            <a:pPr>
+              <a:spcAft>
+                <a:spcPts val="800"/>
+              </a:spcAft>
+              <a:defRPr sz="1400"/>
+            </a:pPr>
+            <a:r>
+              <a:t>Key drivers monitored: net_debt_ex_leases, ebitda, net_debt_incl_leases, interest_cover, net_debt_to_ebitda</a:t>
             </a:r>
           </a:p>
         </p:txBody>
@@ -3219,19 +4387,76 @@
       <p:grpSpPr/>
       <p:sp>
         <p:nvSpPr>
-          <p:cNvPr id="2" name="Title 1"/>
-          <p:cNvSpPr>
-            <a:spLocks noGrp="1"/>
-          </p:cNvSpPr>
-          <p:nvPr>
-            <p:ph type="title"/>
-          </p:nvPr>
-        </p:nvSpPr>
-        <p:spPr/>
-        <p:txBody>
-          <a:bodyPr/>
-          <a:lstStyle/>
-          <a:p>
+          <p:cNvPr id="2" name="Rectangle 1"/>
+          <p:cNvSpPr/>
+          <p:nvPr/>
+        </p:nvSpPr>
+        <p:spPr>
+          <a:xfrm>
+            <a:off x="0" y="0"/>
+            <a:ext cx="12191695" cy="1097280"/>
+          </a:xfrm>
+          <a:prstGeom prst="rect">
+            <a:avLst/>
+          </a:prstGeom>
+          <a:solidFill>
+            <a:srgbClr val="1F4E79"/>
+          </a:solidFill>
+          <a:ln>
+            <a:noFill/>
+          </a:ln>
+        </p:spPr>
+        <p:style>
+          <a:lnRef idx="1">
+            <a:schemeClr val="accent1"/>
+          </a:lnRef>
+          <a:fillRef idx="3">
+            <a:schemeClr val="accent1"/>
+          </a:fillRef>
+          <a:effectRef idx="2">
+            <a:schemeClr val="accent1"/>
+          </a:effectRef>
+          <a:fontRef idx="minor">
+            <a:schemeClr val="lt1"/>
+          </a:fontRef>
+        </p:style>
+        <p:txBody>
+          <a:bodyPr rtlCol="0" anchor="ctr"/>
+          <a:lstStyle/>
+          <a:p>
+            <a:pPr algn="ctr"/>
+          </a:p>
+        </p:txBody>
+      </p:sp>
+      <p:sp>
+        <p:nvSpPr>
+          <p:cNvPr id="3" name="TextBox 2"/>
+          <p:cNvSpPr txBox="1"/>
+          <p:nvPr/>
+        </p:nvSpPr>
+        <p:spPr>
+          <a:xfrm>
+            <a:off x="457200" y="228600"/>
+            <a:ext cx="10972800" cy="731520"/>
+          </a:xfrm>
+          <a:prstGeom prst="rect">
+            <a:avLst/>
+          </a:prstGeom>
+          <a:noFill/>
+        </p:spPr>
+        <p:txBody>
+          <a:bodyPr wrap="none">
+            <a:spAutoFit/>
+          </a:bodyPr>
+          <a:lstStyle/>
+          <a:p>
+            <a:pPr>
+              <a:defRPr sz="2800" b="1">
+                <a:solidFill>
+                  <a:srgbClr val="FFFFFF"/>
+                </a:solidFill>
+              </a:defRPr>
+            </a:pPr>
             <a:r>
               <a:t>Executive Summary</a:t>
             </a:r>
@@ -3240,75 +4465,202 @@
       </p:sp>
       <p:sp>
         <p:nvSpPr>
-          <p:cNvPr id="3" name="Content Placeholder 2"/>
-          <p:cNvSpPr>
-            <a:spLocks noGrp="1"/>
-          </p:cNvSpPr>
-          <p:nvPr>
-            <p:ph idx="1"/>
-          </p:nvPr>
-        </p:nvSpPr>
-        <p:spPr/>
-        <p:txBody>
-          <a:bodyPr/>
-          <a:lstStyle/>
-          <a:p>
+          <p:cNvPr id="4" name="TextBox 3"/>
+          <p:cNvSpPr txBox="1"/>
+          <p:nvPr/>
+        </p:nvSpPr>
+        <p:spPr>
+          <a:xfrm>
+            <a:off x="548640" y="1371600"/>
+            <a:ext cx="10972800" cy="5029200"/>
+          </a:xfrm>
+          <a:prstGeom prst="rect">
+            <a:avLst/>
+          </a:prstGeom>
+          <a:noFill/>
+        </p:spPr>
+        <p:txBody>
+          <a:bodyPr wrap="square">
+            <a:spAutoFit/>
+          </a:bodyPr>
+          <a:lstStyle/>
+          <a:p>
+            <a:pPr>
+              <a:spcAft>
+                <a:spcPts val="800"/>
+              </a:spcAft>
+              <a:defRPr sz="1400"/>
+            </a:pPr>
             <a:r>
               <a:t>This credit review covers Sample (Pty) Ltd for the period ending 2025-06-29.</a:t>
             </a:r>
           </a:p>
-          <a:p/>
-          <a:p>
-            <a:r>
-              <a:t>Internal rating: BBB. Recommendation: Maintain.</a:t>
-            </a:r>
-          </a:p>
-          <a:p/>
-          <a:p>
-            <a:r>
-              <a:t>  Business Risk: N/A (64.2/100)</a:t>
-            </a:r>
-          </a:p>
-          <a:p/>
-          <a:p>
-            <a:r>
-              <a:t>  Financial Performance: N/A (62.2/100)</a:t>
-            </a:r>
-          </a:p>
-          <a:p/>
-          <a:p>
-            <a:r>
-              <a:t>  Liquidity: N/A (49.0/100)</a:t>
-            </a:r>
-          </a:p>
-          <a:p/>
-          <a:p>
-            <a:r>
-              <a:t>  Leverage: N/A (22.5/100)</a:t>
-            </a:r>
-          </a:p>
-          <a:p/>
-          <a:p>
-            <a:r>
-              <a:t>  Accounting Quality: N/A (40.0/100)</a:t>
-            </a:r>
-          </a:p>
-          <a:p/>
-          <a:p>
+          <a:p>
+            <a:pPr>
+              <a:spcAft>
+                <a:spcPts val="800"/>
+              </a:spcAft>
+              <a:defRPr sz="1400"/>
+            </a:pPr>
+          </a:p>
+          <a:p>
+            <a:pPr>
+              <a:spcAft>
+                <a:spcPts val="800"/>
+              </a:spcAft>
+              <a:defRPr sz="1400"/>
+            </a:pPr>
+            <a:r>
+              <a:t>Internal rating: BBB. Recommendation: Caution.</a:t>
+            </a:r>
+          </a:p>
+          <a:p>
+            <a:pPr>
+              <a:spcAft>
+                <a:spcPts val="800"/>
+              </a:spcAft>
+              <a:defRPr sz="1400"/>
+            </a:pPr>
+          </a:p>
+          <a:p>
+            <a:pPr>
+              <a:spcAft>
+                <a:spcPts val="800"/>
+              </a:spcAft>
+              <a:defRPr sz="1400"/>
+            </a:pPr>
+            <a:r>
+              <a:t>• Business Risk: Adequate (64.2/100)</a:t>
+            </a:r>
+          </a:p>
+          <a:p>
+            <a:pPr>
+              <a:spcAft>
+                <a:spcPts val="800"/>
+              </a:spcAft>
+              <a:defRPr sz="1400"/>
+            </a:pPr>
+          </a:p>
+          <a:p>
+            <a:pPr>
+              <a:spcAft>
+                <a:spcPts val="800"/>
+              </a:spcAft>
+              <a:defRPr sz="1400"/>
+            </a:pPr>
+            <a:r>
+              <a:t>• Financial Performance: Adequate (62.2/100)</a:t>
+            </a:r>
+          </a:p>
+          <a:p>
+            <a:pPr>
+              <a:spcAft>
+                <a:spcPts val="800"/>
+              </a:spcAft>
+              <a:defRPr sz="1400"/>
+            </a:pPr>
+          </a:p>
+          <a:p>
+            <a:pPr>
+              <a:spcAft>
+                <a:spcPts val="800"/>
+              </a:spcAft>
+              <a:defRPr sz="1400"/>
+            </a:pPr>
+            <a:r>
+              <a:t>• Liquidity: Weak (40.0/100)</a:t>
+            </a:r>
+          </a:p>
+          <a:p>
+            <a:pPr>
+              <a:spcAft>
+                <a:spcPts val="800"/>
+              </a:spcAft>
+              <a:defRPr sz="1400"/>
+            </a:pPr>
+          </a:p>
+          <a:p>
+            <a:pPr>
+              <a:spcAft>
+                <a:spcPts val="800"/>
+              </a:spcAft>
+              <a:defRPr sz="1400"/>
+            </a:pPr>
+            <a:r>
+              <a:t>• Leverage: Weak (22.5/100)</a:t>
+            </a:r>
+          </a:p>
+          <a:p>
+            <a:pPr>
+              <a:spcAft>
+                <a:spcPts val="800"/>
+              </a:spcAft>
+              <a:defRPr sz="1400"/>
+            </a:pPr>
+          </a:p>
+          <a:p>
+            <a:pPr>
+              <a:spcAft>
+                <a:spcPts val="800"/>
+              </a:spcAft>
+              <a:defRPr sz="1400"/>
+            </a:pPr>
+            <a:r>
+              <a:t>• Accounting Quality: Weak (40.0/100)</a:t>
+            </a:r>
+          </a:p>
+          <a:p>
+            <a:pPr>
+              <a:spcAft>
+                <a:spcPts val="800"/>
+              </a:spcAft>
+              <a:defRPr sz="1400"/>
+            </a:pPr>
+          </a:p>
+          <a:p>
+            <a:pPr>
+              <a:spcAft>
+                <a:spcPts val="800"/>
+              </a:spcAft>
+              <a:defRPr sz="1400"/>
+            </a:pPr>
             <a:r>
               <a:t>Revenue growth: 8.9% YoY.</a:t>
             </a:r>
           </a:p>
-          <a:p/>
-          <a:p>
-            <a:r>
-              <a:t>Net debt/EBITDA (incl. leases): 5.05x.</a:t>
-            </a:r>
-          </a:p>
-          <a:p/>
-          <a:p>
-            <a:r>
-              <a:t>Key risks and mitigants are set out in the sections below.</a:t>
+        </p:txBody>
+      </p:sp>
+      <p:sp>
+        <p:nvSpPr>
+          <p:cNvPr id="5" name="TextBox 4"/>
+          <p:cNvSpPr txBox="1"/>
+          <p:nvPr/>
+        </p:nvSpPr>
+        <p:spPr>
+          <a:xfrm>
+            <a:off x="548640" y="5303520"/>
+            <a:ext cx="10972800" cy="731520"/>
+          </a:xfrm>
+          <a:prstGeom prst="rect">
+            <a:avLst/>
+          </a:prstGeom>
+          <a:noFill/>
+        </p:spPr>
+        <p:txBody>
+          <a:bodyPr wrap="none">
+            <a:spAutoFit/>
+          </a:bodyPr>
+          <a:lstStyle/>
+          <a:p>
+            <a:pPr>
+              <a:defRPr sz="1200" i="1">
+                <a:solidFill>
+                  <a:srgbClr val="2E75B6"/>
+                </a:solidFill>
+              </a:defRPr>
+            </a:pPr>
+            <a:r>
+              <a:t>► Key risks and mitigants are detailed in the sections below.</a:t>
             </a:r>
           </a:p>
         </p:txBody>
@@ -3333,122 +4685,53 @@
       <p:grpSpPr/>
       <p:sp>
         <p:nvSpPr>
-          <p:cNvPr id="2" name="Title 1"/>
-          <p:cNvSpPr>
-            <a:spLocks noGrp="1"/>
-          </p:cNvSpPr>
-          <p:nvPr>
-            <p:ph type="title"/>
-          </p:nvPr>
-        </p:nvSpPr>
-        <p:spPr/>
-        <p:txBody>
-          <a:bodyPr/>
-          <a:lstStyle/>
-          <a:p>
-            <a:r>
-              <a:t>Financial Performance</a:t>
-            </a:r>
-          </a:p>
-        </p:txBody>
-      </p:sp>
-      <p:sp>
-        <p:nvSpPr>
-          <p:cNvPr id="3" name="Content Placeholder 2"/>
-          <p:cNvSpPr>
-            <a:spLocks noGrp="1"/>
-          </p:cNvSpPr>
-          <p:nvPr>
-            <p:ph idx="1"/>
-          </p:nvPr>
-        </p:nvSpPr>
-        <p:spPr/>
-        <p:txBody>
-          <a:bodyPr/>
-          <a:lstStyle/>
-          <a:p>
-            <a:r>
-              <a:t>3-Year Financial Summary:</a:t>
-            </a:r>
-          </a:p>
-          <a:p>
-            <a:r>
-              <a:t>Period | Revenue | EBITDA | EBITDA % | Net Debt | ND/EBITDA | Interest Cover</a:t>
-            </a:r>
-          </a:p>
-          <a:p>
-            <a:r>
-              <a:t>2025-06-30 | 252,701.00 | 6,931.00 | 2.7% | 35,033.00 | 5.05x | 2.92x</a:t>
-            </a:r>
-          </a:p>
-          <a:p>
-            <a:r>
-              <a:t>2024-06-30 | 232,088.00 | 5,817.00 | 2.5% | 27,865.00 | 4.79x | 3.05x</a:t>
-            </a:r>
-          </a:p>
-          <a:p/>
-          <a:p>
-            <a:r>
-              <a:t>Financial Performance Analysis (Score: 62.2/100, Rating: Adequate)</a:t>
-            </a:r>
-          </a:p>
-          <a:p>
-            <a:r>
-              <a:t>  Revenue: 252,701.00</a:t>
-            </a:r>
-          </a:p>
-          <a:p>
-            <a:r>
-              <a:t>  Revenue Growth Pct: 8.9</a:t>
-            </a:r>
-          </a:p>
-          <a:p>
-            <a:r>
-              <a:t>  Ebitda Growth Pct: 19.2</a:t>
-            </a:r>
-          </a:p>
-          <a:p>
-            <a:r>
-              <a:t>  Pat Growth Pct: 21.9</a:t>
-            </a:r>
-          </a:p>
-          <a:p>
-            <a:r>
-              <a:t>  Ebitda Margin Pct: 2.7</a:t>
-            </a:r>
-          </a:p>
-          <a:p>
-            <a:r>
-              <a:t>  Operating Profit: 14,943.00</a:t>
-            </a:r>
-          </a:p>
-          <a:p>
-            <a:r>
-              <a:t>  Profit After Tax: 7,583.00</a:t>
-            </a:r>
-          </a:p>
-          <a:p>
-            <a:r>
-              <a:t>  Cfo To Ebitda: 1.58</a:t>
-            </a:r>
-          </a:p>
-          <a:p>
-            <a:r>
-              <a:t>  Fcf Conversion: 2.5</a:t>
-            </a:r>
-          </a:p>
-          <a:p>
-            <a:r>
-              <a:t>  Evidence: Note 27: Depreciation, Note 30: Operating expenses, Note 33: Finance costs, Note 34: Tax</a:t>
-            </a:r>
-          </a:p>
-          <a:p>
-            <a:r>
-              <a:t>  Financial performance: Adequate. EBITDA margin 2.7%.</a:t>
-            </a:r>
-          </a:p>
-        </p:txBody>
-      </p:sp>
+          <p:cNvPr id="2" name="TextBox 1"/>
+          <p:cNvSpPr txBox="1"/>
+          <p:nvPr/>
+        </p:nvSpPr>
+        <p:spPr>
+          <a:xfrm>
+            <a:off x="457200" y="182880"/>
+            <a:ext cx="10972800" cy="457200"/>
+          </a:xfrm>
+          <a:prstGeom prst="rect">
+            <a:avLst/>
+          </a:prstGeom>
+          <a:noFill/>
+        </p:spPr>
+        <p:txBody>
+          <a:bodyPr wrap="none">
+            <a:spAutoFit/>
+          </a:bodyPr>
+          <a:lstStyle/>
+          <a:p>
+            <a:pPr>
+              <a:defRPr b="1"/>
+            </a:pPr>
+            <a:r>
+              <a:t>Revenue &amp; EBITDA Trend</a:t>
+            </a:r>
+          </a:p>
+        </p:txBody>
+      </p:sp>
+      <p:graphicFrame>
+        <p:nvGraphicFramePr>
+          <p:cNvPr id="3" name="Chart 2"/>
+          <p:cNvGraphicFramePr>
+            <a:graphicFrameLocks noGrp="1"/>
+          </p:cNvGraphicFramePr>
+          <p:nvPr/>
+        </p:nvGraphicFramePr>
+        <p:xfrm>
+          <a:off x="457200" y="640080"/>
+          <a:ext cx="10972800" cy="5303520"/>
+        </p:xfrm>
+        <a:graphic>
+          <a:graphicData uri="http://schemas.openxmlformats.org/drawingml/2006/chart">
+            <c:chart xmlns:c="http://schemas.openxmlformats.org/drawingml/2006/chart" r:id="rId2"/>
+          </a:graphicData>
+        </a:graphic>
+      </p:graphicFrame>
     </p:spTree>
   </p:cSld>
   <p:clrMapOvr>
@@ -3469,106 +4752,53 @@
       <p:grpSpPr/>
       <p:sp>
         <p:nvSpPr>
-          <p:cNvPr id="2" name="Title 1"/>
-          <p:cNvSpPr>
-            <a:spLocks noGrp="1"/>
-          </p:cNvSpPr>
-          <p:nvPr>
-            <p:ph type="title"/>
-          </p:nvPr>
-        </p:nvSpPr>
-        <p:spPr/>
-        <p:txBody>
-          <a:bodyPr/>
-          <a:lstStyle/>
-          <a:p>
-            <a:r>
-              <a:t>Cash Flow &amp; Liquidity</a:t>
-            </a:r>
-          </a:p>
-        </p:txBody>
-      </p:sp>
-      <p:sp>
-        <p:nvSpPr>
-          <p:cNvPr id="3" name="Content Placeholder 2"/>
-          <p:cNvSpPr>
-            <a:spLocks noGrp="1"/>
-          </p:cNvSpPr>
-          <p:nvPr>
-            <p:ph idx="1"/>
-          </p:nvPr>
-        </p:nvSpPr>
-        <p:spPr/>
-        <p:txBody>
-          <a:bodyPr/>
-          <a:lstStyle/>
-          <a:p>
-            <a:r>
-              <a:t>Cash Flow &amp; Liquidity (Score: 49.0/100, Rating: Weak)</a:t>
-            </a:r>
-          </a:p>
-          <a:p>
-            <a:r>
-              <a:t>  Net Cfo: 10,984.00</a:t>
-            </a:r>
-          </a:p>
-          <a:p>
-            <a:r>
-              <a:t>  Capex: -6,320.00</a:t>
-            </a:r>
-          </a:p>
-          <a:p>
-            <a:r>
-              <a:t>  Fcf: 17,304.00</a:t>
-            </a:r>
-          </a:p>
-          <a:p>
-            <a:r>
-              <a:t>  Current Ratio: 0.89</a:t>
-            </a:r>
-          </a:p>
-          <a:p>
-            <a:r>
-              <a:t>  Quick Ratio: 0.23</a:t>
-            </a:r>
-          </a:p>
-          <a:p>
-            <a:r>
-              <a:t>  Cash: 9,946.00</a:t>
-            </a:r>
-          </a:p>
-          <a:p>
-            <a:r>
-              <a:t>  St Debt: 44,979.00</a:t>
-            </a:r>
-          </a:p>
-          <a:p>
-            <a:r>
-              <a:t>  St Debt To Cash: 4.52</a:t>
-            </a:r>
-          </a:p>
-          <a:p>
-            <a:r>
-              <a:t>  Lease Adjusted Liquidity: -33,170.00</a:t>
-            </a:r>
-          </a:p>
-          <a:p>
-            <a:r>
-              <a:t>  Risk flags: Current ratio below 1.0x - Weak liquidity; ST debt/cash elevated</a:t>
-            </a:r>
-          </a:p>
-          <a:p>
-            <a:r>
-              <a:t>  Evidence: Note 38: Cash flows, Note 21: Borrowings, Note 20: Lease liabilities, Note 48: Going concern</a:t>
-            </a:r>
-          </a:p>
-          <a:p>
-            <a:r>
-              <a:t>  Liquidity: Weak. Current ratio 0.89x. Cash 9,946.</a:t>
-            </a:r>
-          </a:p>
-        </p:txBody>
-      </p:sp>
+          <p:cNvPr id="2" name="TextBox 1"/>
+          <p:cNvSpPr txBox="1"/>
+          <p:nvPr/>
+        </p:nvSpPr>
+        <p:spPr>
+          <a:xfrm>
+            <a:off x="457200" y="182880"/>
+            <a:ext cx="10972800" cy="457200"/>
+          </a:xfrm>
+          <a:prstGeom prst="rect">
+            <a:avLst/>
+          </a:prstGeom>
+          <a:noFill/>
+        </p:spPr>
+        <p:txBody>
+          <a:bodyPr wrap="none">
+            <a:spAutoFit/>
+          </a:bodyPr>
+          <a:lstStyle/>
+          <a:p>
+            <a:pPr>
+              <a:defRPr b="1"/>
+            </a:pPr>
+            <a:r>
+              <a:t>ND/EBITDA Trend</a:t>
+            </a:r>
+          </a:p>
+        </p:txBody>
+      </p:sp>
+      <p:graphicFrame>
+        <p:nvGraphicFramePr>
+          <p:cNvPr id="3" name="Chart 2"/>
+          <p:cNvGraphicFramePr>
+            <a:graphicFrameLocks noGrp="1"/>
+          </p:cNvGraphicFramePr>
+          <p:nvPr/>
+        </p:nvGraphicFramePr>
+        <p:xfrm>
+          <a:off x="457200" y="640080"/>
+          <a:ext cx="10972800" cy="5303520"/>
+        </p:xfrm>
+        <a:graphic>
+          <a:graphicData uri="http://schemas.openxmlformats.org/drawingml/2006/chart">
+            <c:chart xmlns:c="http://schemas.openxmlformats.org/drawingml/2006/chart" r:id="rId2"/>
+          </a:graphicData>
+        </a:graphic>
+      </p:graphicFrame>
     </p:spTree>
   </p:cSld>
   <p:clrMapOvr>
@@ -3589,106 +4819,53 @@
       <p:grpSpPr/>
       <p:sp>
         <p:nvSpPr>
-          <p:cNvPr id="2" name="Title 1"/>
-          <p:cNvSpPr>
-            <a:spLocks noGrp="1"/>
-          </p:cNvSpPr>
-          <p:nvPr>
-            <p:ph type="title"/>
-          </p:nvPr>
-        </p:nvSpPr>
-        <p:spPr/>
-        <p:txBody>
-          <a:bodyPr/>
-          <a:lstStyle/>
-          <a:p>
-            <a:r>
-              <a:t>Balance Sheet &amp; Leverage</a:t>
-            </a:r>
-          </a:p>
-        </p:txBody>
-      </p:sp>
-      <p:sp>
-        <p:nvSpPr>
-          <p:cNvPr id="3" name="Content Placeholder 2"/>
-          <p:cNvSpPr>
-            <a:spLocks noGrp="1"/>
-          </p:cNvSpPr>
-          <p:nvPr>
-            <p:ph idx="1"/>
-          </p:nvPr>
-        </p:nvSpPr>
-        <p:spPr/>
-        <p:txBody>
-          <a:bodyPr/>
-          <a:lstStyle/>
-          <a:p>
-            <a:r>
-              <a:t>Leverage &amp; Capital Structure (Score: 22.5/100, Rating: Weak)</a:t>
-            </a:r>
-          </a:p>
-          <a:p>
-            <a:r>
-              <a:t>  Net Debt Ex Leases: -8,083.00</a:t>
-            </a:r>
-          </a:p>
-          <a:p>
-            <a:r>
-              <a:t>  Net Debt Incl Leases: 35,033.00</a:t>
-            </a:r>
-          </a:p>
-          <a:p>
-            <a:r>
-              <a:t>  Gross Debt: 44,979.00</a:t>
-            </a:r>
-          </a:p>
-          <a:p>
-            <a:r>
-              <a:t>  Debt To Capital: 0.8568</a:t>
-            </a:r>
-          </a:p>
-          <a:p>
-            <a:r>
-              <a:t>  Net Debt To Ebitda Ex Leases: -1.17</a:t>
-            </a:r>
-          </a:p>
-          <a:p>
-            <a:r>
-              <a:t>  Net Debt To Ebitda Incl Leases: 5.05</a:t>
-            </a:r>
-          </a:p>
-          <a:p>
-            <a:r>
-              <a:t>  Ebitda To Interest: 1.34</a:t>
-            </a:r>
-          </a:p>
-          <a:p>
-            <a:r>
-              <a:t>  Fixed Charge Cover: 0.73</a:t>
-            </a:r>
-          </a:p>
-          <a:p>
-            <a:r>
-              <a:t>  Lease Adjusted Interest Cover: 0.73</a:t>
-            </a:r>
-          </a:p>
-          <a:p>
-            <a:r>
-              <a:t>  Risk flags: High leverage (ND/EBITDA &gt; 4x); Interest cover below 2x</a:t>
-            </a:r>
-          </a:p>
-          <a:p>
-            <a:r>
-              <a:t>  Evidence: Note 21: Borrowings, Note 20: Lease liabilities, Note 39: Contingent liabilities</a:t>
-            </a:r>
-          </a:p>
-          <a:p>
-            <a:r>
-              <a:t>  Leverage: Weak. ND/EBITDA 5.05x. Interest cover 1.34x.</a:t>
-            </a:r>
-          </a:p>
-        </p:txBody>
-      </p:sp>
+          <p:cNvPr id="2" name="TextBox 1"/>
+          <p:cNvSpPr txBox="1"/>
+          <p:nvPr/>
+        </p:nvSpPr>
+        <p:spPr>
+          <a:xfrm>
+            <a:off x="457200" y="182880"/>
+            <a:ext cx="10972800" cy="457200"/>
+          </a:xfrm>
+          <a:prstGeom prst="rect">
+            <a:avLst/>
+          </a:prstGeom>
+          <a:noFill/>
+        </p:spPr>
+        <p:txBody>
+          <a:bodyPr wrap="none">
+            <a:spAutoFit/>
+          </a:bodyPr>
+          <a:lstStyle/>
+          <a:p>
+            <a:pPr>
+              <a:defRPr b="1"/>
+            </a:pPr>
+            <a:r>
+              <a:t>CFO vs Capex</a:t>
+            </a:r>
+          </a:p>
+        </p:txBody>
+      </p:sp>
+      <p:graphicFrame>
+        <p:nvGraphicFramePr>
+          <p:cNvPr id="3" name="Chart 2"/>
+          <p:cNvGraphicFramePr>
+            <a:graphicFrameLocks noGrp="1"/>
+          </p:cNvGraphicFramePr>
+          <p:nvPr/>
+        </p:nvGraphicFramePr>
+        <p:xfrm>
+          <a:off x="457200" y="640080"/>
+          <a:ext cx="10972800" cy="5303520"/>
+        </p:xfrm>
+        <a:graphic>
+          <a:graphicData uri="http://schemas.openxmlformats.org/drawingml/2006/chart">
+            <c:chart xmlns:c="http://schemas.openxmlformats.org/drawingml/2006/chart" r:id="rId2"/>
+          </a:graphicData>
+        </a:graphic>
+      </p:graphicFrame>
     </p:spTree>
   </p:cSld>
   <p:clrMapOvr>
@@ -3709,42 +4886,251 @@
       <p:grpSpPr/>
       <p:sp>
         <p:nvSpPr>
-          <p:cNvPr id="2" name="Title 1"/>
-          <p:cNvSpPr>
-            <a:spLocks noGrp="1"/>
-          </p:cNvSpPr>
-          <p:nvPr>
-            <p:ph type="title"/>
-          </p:nvPr>
-        </p:nvSpPr>
-        <p:spPr/>
-        <p:txBody>
-          <a:bodyPr/>
-          <a:lstStyle/>
-          <a:p>
-            <a:r>
-              <a:t>Key Risks</a:t>
-            </a:r>
-          </a:p>
-        </p:txBody>
-      </p:sp>
-      <p:sp>
-        <p:nvSpPr>
-          <p:cNvPr id="3" name="Content Placeholder 2"/>
-          <p:cNvSpPr>
-            <a:spLocks noGrp="1"/>
-          </p:cNvSpPr>
-          <p:nvPr>
-            <p:ph idx="1"/>
-          </p:nvPr>
-        </p:nvSpPr>
-        <p:spPr/>
-        <p:txBody>
-          <a:bodyPr/>
-          <a:lstStyle/>
-          <a:p>
-            <a:r>
-              <a:t>Significant judgement (Note 1): -10; Impairment sensitivity disclosed: -10; Going concern uncertainty: -20; A_revenue_minus_10pct: ND/EBITDA above 3x; C_working_capital_shock: Cash negative after shock; D_margin_compression_200bps: Interest cover below 2x</a:t>
+          <p:cNvPr id="2" name="Rectangle 1"/>
+          <p:cNvSpPr/>
+          <p:nvPr/>
+        </p:nvSpPr>
+        <p:spPr>
+          <a:xfrm>
+            <a:off x="0" y="0"/>
+            <a:ext cx="12191695" cy="1097280"/>
+          </a:xfrm>
+          <a:prstGeom prst="rect">
+            <a:avLst/>
+          </a:prstGeom>
+          <a:solidFill>
+            <a:srgbClr val="1F4E79"/>
+          </a:solidFill>
+          <a:ln>
+            <a:noFill/>
+          </a:ln>
+        </p:spPr>
+        <p:style>
+          <a:lnRef idx="1">
+            <a:schemeClr val="accent1"/>
+          </a:lnRef>
+          <a:fillRef idx="3">
+            <a:schemeClr val="accent1"/>
+          </a:fillRef>
+          <a:effectRef idx="2">
+            <a:schemeClr val="accent1"/>
+          </a:effectRef>
+          <a:fontRef idx="minor">
+            <a:schemeClr val="lt1"/>
+          </a:fontRef>
+        </p:style>
+        <p:txBody>
+          <a:bodyPr rtlCol="0" anchor="ctr"/>
+          <a:lstStyle/>
+          <a:p>
+            <a:pPr algn="ctr"/>
+          </a:p>
+        </p:txBody>
+      </p:sp>
+      <p:sp>
+        <p:nvSpPr>
+          <p:cNvPr id="3" name="TextBox 2"/>
+          <p:cNvSpPr txBox="1"/>
+          <p:nvPr/>
+        </p:nvSpPr>
+        <p:spPr>
+          <a:xfrm>
+            <a:off x="457200" y="228600"/>
+            <a:ext cx="10972800" cy="731520"/>
+          </a:xfrm>
+          <a:prstGeom prst="rect">
+            <a:avLst/>
+          </a:prstGeom>
+          <a:noFill/>
+        </p:spPr>
+        <p:txBody>
+          <a:bodyPr wrap="none">
+            <a:spAutoFit/>
+          </a:bodyPr>
+          <a:lstStyle/>
+          <a:p>
+            <a:pPr>
+              <a:defRPr sz="2800" b="1">
+                <a:solidFill>
+                  <a:srgbClr val="FFFFFF"/>
+                </a:solidFill>
+              </a:defRPr>
+            </a:pPr>
+            <a:r>
+              <a:t>Financial Performance</a:t>
+            </a:r>
+          </a:p>
+        </p:txBody>
+      </p:sp>
+      <p:sp>
+        <p:nvSpPr>
+          <p:cNvPr id="4" name="TextBox 3"/>
+          <p:cNvSpPr txBox="1"/>
+          <p:nvPr/>
+        </p:nvSpPr>
+        <p:spPr>
+          <a:xfrm>
+            <a:off x="548640" y="1371600"/>
+            <a:ext cx="10972800" cy="5029200"/>
+          </a:xfrm>
+          <a:prstGeom prst="rect">
+            <a:avLst/>
+          </a:prstGeom>
+          <a:noFill/>
+        </p:spPr>
+        <p:txBody>
+          <a:bodyPr wrap="square">
+            <a:spAutoFit/>
+          </a:bodyPr>
+          <a:lstStyle/>
+          <a:p>
+            <a:pPr>
+              <a:spcAft>
+                <a:spcPts val="800"/>
+              </a:spcAft>
+              <a:defRPr sz="1400"/>
+            </a:pPr>
+            <a:r>
+              <a:t>3-Year Financial Summary:</a:t>
+            </a:r>
+          </a:p>
+          <a:p>
+            <a:pPr>
+              <a:spcAft>
+                <a:spcPts val="800"/>
+              </a:spcAft>
+              <a:defRPr sz="1400"/>
+            </a:pPr>
+            <a:r>
+              <a:t>Period | Revenue | EBITDA | EBITDA % | Net Debt | ND/EBITDA | Interest Cover</a:t>
+            </a:r>
+          </a:p>
+          <a:p>
+            <a:pPr>
+              <a:spcAft>
+                <a:spcPts val="800"/>
+              </a:spcAft>
+              <a:defRPr sz="1400"/>
+            </a:pPr>
+            <a:r>
+              <a:t>2025-06-30 | 252,701.00 | 6,931.00 | 2.7% | 35,033.00 | 5.05x | 2.92x</a:t>
+            </a:r>
+          </a:p>
+          <a:p>
+            <a:pPr>
+              <a:spcAft>
+                <a:spcPts val="800"/>
+              </a:spcAft>
+              <a:defRPr sz="1400"/>
+            </a:pPr>
+            <a:r>
+              <a:t>2024-06-30 | 232,088.00 | 5,817.00 | 2.5% | 27,865.00 | 4.79x | 3.05x</a:t>
+            </a:r>
+          </a:p>
+          <a:p>
+            <a:pPr>
+              <a:spcAft>
+                <a:spcPts val="800"/>
+              </a:spcAft>
+              <a:defRPr sz="1400"/>
+            </a:pPr>
+            <a:r>
+              <a:t>2023-06-30 | 214,956.00 | 6,042.00 | 2.8% | 26,538.00 | 4.39x | 3.37x</a:t>
+            </a:r>
+          </a:p>
+          <a:p>
+            <a:pPr>
+              <a:spcAft>
+                <a:spcPts val="800"/>
+              </a:spcAft>
+              <a:defRPr sz="1400"/>
+            </a:pPr>
+          </a:p>
+          <a:p>
+            <a:pPr>
+              <a:spcAft>
+                <a:spcPts val="800"/>
+              </a:spcAft>
+              <a:defRPr sz="1400"/>
+            </a:pPr>
+            <a:r>
+              <a:t>Financial Performance Analysis — Score: 62.2/100, Rating: Adequate</a:t>
+            </a:r>
+          </a:p>
+          <a:p>
+            <a:pPr>
+              <a:spcAft>
+                <a:spcPts val="800"/>
+              </a:spcAft>
+              <a:defRPr sz="1400"/>
+            </a:pPr>
+          </a:p>
+          <a:p>
+            <a:pPr>
+              <a:spcAft>
+                <a:spcPts val="800"/>
+              </a:spcAft>
+              <a:defRPr sz="1400"/>
+            </a:pPr>
+            <a:r>
+              <a:t>Revenue of 252,701.00  grew 8.9% YoY .  EBITDA margin is 2.7%.</a:t>
+            </a:r>
+          </a:p>
+          <a:p>
+            <a:pPr>
+              <a:spcAft>
+                <a:spcPts val="800"/>
+              </a:spcAft>
+              <a:defRPr sz="1400"/>
+            </a:pPr>
+          </a:p>
+          <a:p>
+            <a:pPr>
+              <a:spcAft>
+                <a:spcPts val="800"/>
+              </a:spcAft>
+              <a:defRPr sz="1400"/>
+            </a:pPr>
+            <a:r>
+              <a:t>CFO/EBITDA of 1.58x indicates strong cash conversion from earnings.  FCF conversion supports debt service capacity.</a:t>
+            </a:r>
+          </a:p>
+          <a:p>
+            <a:pPr>
+              <a:spcAft>
+                <a:spcPts val="800"/>
+              </a:spcAft>
+              <a:defRPr sz="1400"/>
+            </a:pPr>
+          </a:p>
+          <a:p>
+            <a:pPr>
+              <a:spcAft>
+                <a:spcPts val="800"/>
+              </a:spcAft>
+              <a:defRPr sz="1400"/>
+            </a:pPr>
+            <a:r>
+              <a:t>EBITDA margin of 2.7% reflects operating efficiency and pricing power.</a:t>
+            </a:r>
+          </a:p>
+          <a:p>
+            <a:pPr>
+              <a:spcAft>
+                <a:spcPts val="800"/>
+              </a:spcAft>
+              <a:defRPr sz="1400"/>
+            </a:pPr>
+          </a:p>
+          <a:p>
+            <a:pPr>
+              <a:spcAft>
+                <a:spcPts val="800"/>
+              </a:spcAft>
+              <a:defRPr sz="1400"/>
+            </a:pPr>
+            <a:r>
+              <a:t>Revenue concentration and cyclicality are assessed in the business risk section.</a:t>
             </a:r>
           </a:p>
         </p:txBody>
@@ -3769,62 +5155,283 @@
       <p:grpSpPr/>
       <p:sp>
         <p:nvSpPr>
-          <p:cNvPr id="2" name="Title 1"/>
-          <p:cNvSpPr>
-            <a:spLocks noGrp="1"/>
-          </p:cNvSpPr>
-          <p:nvPr>
-            <p:ph type="title"/>
-          </p:nvPr>
-        </p:nvSpPr>
-        <p:spPr/>
-        <p:txBody>
-          <a:bodyPr/>
-          <a:lstStyle/>
-          <a:p>
-            <a:r>
-              <a:t>Stress Testing Results</a:t>
-            </a:r>
-          </a:p>
-        </p:txBody>
-      </p:sp>
-      <p:sp>
-        <p:nvSpPr>
-          <p:cNvPr id="3" name="Content Placeholder 2"/>
-          <p:cNvSpPr>
-            <a:spLocks noGrp="1"/>
-          </p:cNvSpPr>
-          <p:nvPr>
-            <p:ph idx="1"/>
-          </p:nvPr>
-        </p:nvSpPr>
-        <p:spPr/>
-        <p:txBody>
-          <a:bodyPr/>
-          <a:lstStyle/>
-          <a:p>
-            <a:r>
-              <a:t>A_revenue_minus_10pct: Interest cover 2.63x ND/EBITDA 5.62x</a:t>
-            </a:r>
-          </a:p>
-          <a:p>
-            <a:r>
-              <a:t>B_interest_plus_200bps: Interest cover 2.90x</a:t>
-            </a:r>
-          </a:p>
-          <a:p>
-            <a:r>
-              <a:t>C_working_capital_shock: Cash after shock: -15,324.10</a:t>
-            </a:r>
-          </a:p>
-          <a:p>
-            <a:r>
-              <a:t>D_margin_compression_200bps: Interest cover 0.79x ND/EBITDA 18.66x</a:t>
-            </a:r>
-          </a:p>
-          <a:p>
-            <a:r>
-              <a:t>E_combined: Interest cover 2.61x ND/EBITDA 5.62x</a:t>
+          <p:cNvPr id="2" name="Rectangle 1"/>
+          <p:cNvSpPr/>
+          <p:nvPr/>
+        </p:nvSpPr>
+        <p:spPr>
+          <a:xfrm>
+            <a:off x="0" y="0"/>
+            <a:ext cx="12191695" cy="1097280"/>
+          </a:xfrm>
+          <a:prstGeom prst="rect">
+            <a:avLst/>
+          </a:prstGeom>
+          <a:solidFill>
+            <a:srgbClr val="1F4E79"/>
+          </a:solidFill>
+          <a:ln>
+            <a:noFill/>
+          </a:ln>
+        </p:spPr>
+        <p:style>
+          <a:lnRef idx="1">
+            <a:schemeClr val="accent1"/>
+          </a:lnRef>
+          <a:fillRef idx="3">
+            <a:schemeClr val="accent1"/>
+          </a:fillRef>
+          <a:effectRef idx="2">
+            <a:schemeClr val="accent1"/>
+          </a:effectRef>
+          <a:fontRef idx="minor">
+            <a:schemeClr val="lt1"/>
+          </a:fontRef>
+        </p:style>
+        <p:txBody>
+          <a:bodyPr rtlCol="0" anchor="ctr"/>
+          <a:lstStyle/>
+          <a:p>
+            <a:pPr algn="ctr"/>
+          </a:p>
+        </p:txBody>
+      </p:sp>
+      <p:sp>
+        <p:nvSpPr>
+          <p:cNvPr id="3" name="TextBox 2"/>
+          <p:cNvSpPr txBox="1"/>
+          <p:nvPr/>
+        </p:nvSpPr>
+        <p:spPr>
+          <a:xfrm>
+            <a:off x="457200" y="228600"/>
+            <a:ext cx="10972800" cy="731520"/>
+          </a:xfrm>
+          <a:prstGeom prst="rect">
+            <a:avLst/>
+          </a:prstGeom>
+          <a:noFill/>
+        </p:spPr>
+        <p:txBody>
+          <a:bodyPr wrap="none">
+            <a:spAutoFit/>
+          </a:bodyPr>
+          <a:lstStyle/>
+          <a:p>
+            <a:pPr>
+              <a:defRPr sz="2800" b="1">
+                <a:solidFill>
+                  <a:srgbClr val="FFFFFF"/>
+                </a:solidFill>
+              </a:defRPr>
+            </a:pPr>
+            <a:r>
+              <a:t>Cash Flow &amp; Liquidity</a:t>
+            </a:r>
+          </a:p>
+        </p:txBody>
+      </p:sp>
+      <p:sp>
+        <p:nvSpPr>
+          <p:cNvPr id="4" name="TextBox 3"/>
+          <p:cNvSpPr txBox="1"/>
+          <p:nvPr/>
+        </p:nvSpPr>
+        <p:spPr>
+          <a:xfrm>
+            <a:off x="548640" y="1371600"/>
+            <a:ext cx="10972800" cy="5029200"/>
+          </a:xfrm>
+          <a:prstGeom prst="rect">
+            <a:avLst/>
+          </a:prstGeom>
+          <a:noFill/>
+        </p:spPr>
+        <p:txBody>
+          <a:bodyPr wrap="square">
+            <a:spAutoFit/>
+          </a:bodyPr>
+          <a:lstStyle/>
+          <a:p>
+            <a:pPr>
+              <a:spcAft>
+                <a:spcPts val="800"/>
+              </a:spcAft>
+              <a:defRPr sz="1400"/>
+            </a:pPr>
+            <a:r>
+              <a:t>Cash Flow &amp; Liquidity — Score: 40.0/100, Rating: Weak</a:t>
+            </a:r>
+          </a:p>
+          <a:p>
+            <a:pPr>
+              <a:spcAft>
+                <a:spcPts val="800"/>
+              </a:spcAft>
+              <a:defRPr sz="1400"/>
+            </a:pPr>
+          </a:p>
+          <a:p>
+            <a:pPr>
+              <a:spcAft>
+                <a:spcPts val="800"/>
+              </a:spcAft>
+              <a:defRPr sz="1400"/>
+            </a:pPr>
+            <a:r>
+              <a:t>12-month forward liquidity coverage (sources/uses) is 0.21x.  Liquidity surplus over 12 months: -77,275.02.</a:t>
+            </a:r>
+          </a:p>
+          <a:p>
+            <a:pPr>
+              <a:spcAft>
+                <a:spcPts val="800"/>
+              </a:spcAft>
+              <a:defRPr sz="1400"/>
+            </a:pPr>
+          </a:p>
+          <a:p>
+            <a:pPr>
+              <a:spcAft>
+                <a:spcPts val="800"/>
+              </a:spcAft>
+              <a:defRPr sz="1400"/>
+            </a:pPr>
+            <a:r>
+              <a:t>Opening cash of 9,946.00 against ST debt of 44,979.00  implies reliance on undrawn facilities or operating cash flow ...</a:t>
+            </a:r>
+          </a:p>
+          <a:p>
+            <a:pPr>
+              <a:spcAft>
+                <a:spcPts val="800"/>
+              </a:spcAft>
+              <a:defRPr sz="1400"/>
+            </a:pPr>
+          </a:p>
+          <a:p>
+            <a:pPr>
+              <a:spcAft>
+                <a:spcPts val="800"/>
+              </a:spcAft>
+              <a:defRPr sz="1400"/>
+            </a:pPr>
+            <a:r>
+              <a:t>Liquidity is critical; sources are insufficient to cover 12-month uses.</a:t>
+            </a:r>
+          </a:p>
+          <a:p>
+            <a:pPr>
+              <a:spcAft>
+                <a:spcPts val="800"/>
+              </a:spcAft>
+              <a:defRPr sz="1400"/>
+            </a:pPr>
+          </a:p>
+          <a:p>
+            <a:pPr>
+              <a:spcAft>
+                <a:spcPts val="800"/>
+              </a:spcAft>
+              <a:defRPr sz="1400"/>
+            </a:pPr>
+            <a:r>
+              <a:t>Current ratio below 1.0x indicates short-term obligations exceed liquid assets.</a:t>
+            </a:r>
+          </a:p>
+          <a:p>
+            <a:pPr>
+              <a:spcAft>
+                <a:spcPts val="800"/>
+              </a:spcAft>
+              <a:defRPr sz="1400"/>
+            </a:pPr>
+          </a:p>
+          <a:p>
+            <a:pPr>
+              <a:spcAft>
+                <a:spcPts val="800"/>
+              </a:spcAft>
+              <a:defRPr sz="1400"/>
+            </a:pPr>
+            <a:r>
+              <a:t>The liquidity profile is weak and influences the rating through governance caps where applicable.</a:t>
+            </a:r>
+          </a:p>
+          <a:p>
+            <a:pPr>
+              <a:spcAft>
+                <a:spcPts val="800"/>
+              </a:spcAft>
+              <a:defRPr sz="1400"/>
+            </a:pPr>
+          </a:p>
+          <a:p>
+            <a:pPr>
+              <a:spcAft>
+                <a:spcPts val="800"/>
+              </a:spcAft>
+              <a:defRPr sz="1400"/>
+            </a:pPr>
+            <a:r>
+              <a:t>Key metrics:</a:t>
+            </a:r>
+          </a:p>
+          <a:p>
+            <a:pPr>
+              <a:spcAft>
+                <a:spcPts val="800"/>
+              </a:spcAft>
+              <a:defRPr sz="1400"/>
+            </a:pPr>
+            <a:r>
+              <a:t>- Current Ratio: 0.89</a:t>
+            </a:r>
+          </a:p>
+          <a:p>
+            <a:pPr>
+              <a:spcAft>
+                <a:spcPts val="800"/>
+              </a:spcAft>
+              <a:defRPr sz="1400"/>
+            </a:pPr>
+            <a:r>
+              <a:t>- Liquidity Coverage Ratio: 0.21</a:t>
+            </a:r>
+          </a:p>
+        </p:txBody>
+      </p:sp>
+      <p:sp>
+        <p:nvSpPr>
+          <p:cNvPr id="5" name="TextBox 4"/>
+          <p:cNvSpPr txBox="1"/>
+          <p:nvPr/>
+        </p:nvSpPr>
+        <p:spPr>
+          <a:xfrm>
+            <a:off x="548640" y="5303520"/>
+            <a:ext cx="10972800" cy="731520"/>
+          </a:xfrm>
+          <a:prstGeom prst="rect">
+            <a:avLst/>
+          </a:prstGeom>
+          <a:noFill/>
+        </p:spPr>
+        <p:txBody>
+          <a:bodyPr wrap="none">
+            <a:spAutoFit/>
+          </a:bodyPr>
+          <a:lstStyle/>
+          <a:p>
+            <a:pPr>
+              <a:defRPr sz="1200" i="1">
+                <a:solidFill>
+                  <a:srgbClr val="2E75B6"/>
+                </a:solidFill>
+              </a:defRPr>
+            </a:pPr>
+            <a:r>
+              <a:t>► 12-month forward liquidity model.</a:t>
             </a:r>
           </a:p>
         </p:txBody>
@@ -3849,42 +5456,248 @@
       <p:grpSpPr/>
       <p:sp>
         <p:nvSpPr>
-          <p:cNvPr id="2" name="Title 1"/>
-          <p:cNvSpPr>
-            <a:spLocks noGrp="1"/>
-          </p:cNvSpPr>
-          <p:nvPr>
-            <p:ph type="title"/>
-          </p:nvPr>
-        </p:nvSpPr>
-        <p:spPr/>
-        <p:txBody>
-          <a:bodyPr/>
-          <a:lstStyle/>
-          <a:p>
-            <a:r>
-              <a:t>Internal Rating Rationale</a:t>
-            </a:r>
-          </a:p>
-        </p:txBody>
-      </p:sp>
-      <p:sp>
-        <p:nvSpPr>
-          <p:cNvPr id="3" name="Content Placeholder 2"/>
-          <p:cNvSpPr>
-            <a:spLocks noGrp="1"/>
-          </p:cNvSpPr>
-          <p:nvPr>
-            <p:ph idx="1"/>
-          </p:nvPr>
-        </p:nvSpPr>
-        <p:spPr/>
-        <p:txBody>
-          <a:bodyPr/>
-          <a:lstStyle/>
-          <a:p>
-            <a:r>
-              <a:t>Internal rating: BBB. Aggregate score: 49.9/100. Business Risk: . Financial Performance: . Liquidity: . Leverage: . Accounting Quality: .  Governance rules applied: Leverage score &lt;30 cap BB; Interest cover &lt;1.5x cap B+; Stress ND&gt;6x downgrade 1 notch.</a:t>
+          <p:cNvPr id="2" name="Rectangle 1"/>
+          <p:cNvSpPr/>
+          <p:nvPr/>
+        </p:nvSpPr>
+        <p:spPr>
+          <a:xfrm>
+            <a:off x="0" y="0"/>
+            <a:ext cx="12191695" cy="1097280"/>
+          </a:xfrm>
+          <a:prstGeom prst="rect">
+            <a:avLst/>
+          </a:prstGeom>
+          <a:solidFill>
+            <a:srgbClr val="1F4E79"/>
+          </a:solidFill>
+          <a:ln>
+            <a:noFill/>
+          </a:ln>
+        </p:spPr>
+        <p:style>
+          <a:lnRef idx="1">
+            <a:schemeClr val="accent1"/>
+          </a:lnRef>
+          <a:fillRef idx="3">
+            <a:schemeClr val="accent1"/>
+          </a:fillRef>
+          <a:effectRef idx="2">
+            <a:schemeClr val="accent1"/>
+          </a:effectRef>
+          <a:fontRef idx="minor">
+            <a:schemeClr val="lt1"/>
+          </a:fontRef>
+        </p:style>
+        <p:txBody>
+          <a:bodyPr rtlCol="0" anchor="ctr"/>
+          <a:lstStyle/>
+          <a:p>
+            <a:pPr algn="ctr"/>
+          </a:p>
+        </p:txBody>
+      </p:sp>
+      <p:sp>
+        <p:nvSpPr>
+          <p:cNvPr id="3" name="TextBox 2"/>
+          <p:cNvSpPr txBox="1"/>
+          <p:nvPr/>
+        </p:nvSpPr>
+        <p:spPr>
+          <a:xfrm>
+            <a:off x="457200" y="228600"/>
+            <a:ext cx="10972800" cy="731520"/>
+          </a:xfrm>
+          <a:prstGeom prst="rect">
+            <a:avLst/>
+          </a:prstGeom>
+          <a:noFill/>
+        </p:spPr>
+        <p:txBody>
+          <a:bodyPr wrap="none">
+            <a:spAutoFit/>
+          </a:bodyPr>
+          <a:lstStyle/>
+          <a:p>
+            <a:pPr>
+              <a:defRPr sz="2800" b="1">
+                <a:solidFill>
+                  <a:srgbClr val="FFFFFF"/>
+                </a:solidFill>
+              </a:defRPr>
+            </a:pPr>
+            <a:r>
+              <a:t>Balance Sheet &amp; Leverage</a:t>
+            </a:r>
+          </a:p>
+        </p:txBody>
+      </p:sp>
+      <p:sp>
+        <p:nvSpPr>
+          <p:cNvPr id="4" name="TextBox 3"/>
+          <p:cNvSpPr txBox="1"/>
+          <p:nvPr/>
+        </p:nvSpPr>
+        <p:spPr>
+          <a:xfrm>
+            <a:off x="548640" y="1371600"/>
+            <a:ext cx="10972800" cy="5029200"/>
+          </a:xfrm>
+          <a:prstGeom prst="rect">
+            <a:avLst/>
+          </a:prstGeom>
+          <a:noFill/>
+        </p:spPr>
+        <p:txBody>
+          <a:bodyPr wrap="square">
+            <a:spAutoFit/>
+          </a:bodyPr>
+          <a:lstStyle/>
+          <a:p>
+            <a:pPr>
+              <a:spcAft>
+                <a:spcPts val="800"/>
+              </a:spcAft>
+              <a:defRPr sz="1400"/>
+            </a:pPr>
+            <a:r>
+              <a:t>Leverage &amp; Capital Structure — Score: 22.5/100, Rating: Weak</a:t>
+            </a:r>
+          </a:p>
+          <a:p>
+            <a:pPr>
+              <a:spcAft>
+                <a:spcPts val="800"/>
+              </a:spcAft>
+              <a:defRPr sz="1400"/>
+            </a:pPr>
+          </a:p>
+          <a:p>
+            <a:pPr>
+              <a:spcAft>
+                <a:spcPts val="800"/>
+              </a:spcAft>
+              <a:defRPr sz="1400"/>
+            </a:pPr>
+            <a:r>
+              <a:t>Net debt/EBITDA (incl. leases) is 5.05x , increasing from 4.79x in the prior period.  Interest cover stands at 1.34x.</a:t>
+            </a:r>
+          </a:p>
+          <a:p>
+            <a:pPr>
+              <a:spcAft>
+                <a:spcPts val="800"/>
+              </a:spcAft>
+              <a:defRPr sz="1400"/>
+            </a:pPr>
+          </a:p>
+          <a:p>
+            <a:pPr>
+              <a:spcAft>
+                <a:spcPts val="800"/>
+              </a:spcAft>
+              <a:defRPr sz="1400"/>
+            </a:pPr>
+            <a:r>
+              <a:t>The increase in leverage reflects  higher debt and/or lower EBITDA.  Net debt ex-leases is negative (cash exceeds deb...</a:t>
+            </a:r>
+          </a:p>
+          <a:p>
+            <a:pPr>
+              <a:spcAft>
+                <a:spcPts val="800"/>
+              </a:spcAft>
+              <a:defRPr sz="1400"/>
+            </a:pPr>
+          </a:p>
+          <a:p>
+            <a:pPr>
+              <a:spcAft>
+                <a:spcPts val="800"/>
+              </a:spcAft>
+              <a:defRPr sz="1400"/>
+            </a:pPr>
+            <a:r>
+              <a:t>Leverage of 5.05x is  structurally elevated and inconsistent with investment-grade metrics.</a:t>
+            </a:r>
+          </a:p>
+          <a:p>
+            <a:pPr>
+              <a:spcAft>
+                <a:spcPts val="800"/>
+              </a:spcAft>
+              <a:defRPr sz="1400"/>
+            </a:pPr>
+          </a:p>
+          <a:p>
+            <a:pPr>
+              <a:spcAft>
+                <a:spcPts val="800"/>
+              </a:spcAft>
+              <a:defRPr sz="1400"/>
+            </a:pPr>
+            <a:r>
+              <a:t>Current leverage exceeds covenant threshold of 2.8x, indicating breach risk.  Under a 10% revenue stress scenario lev...</a:t>
+            </a:r>
+          </a:p>
+          <a:p>
+            <a:pPr>
+              <a:spcAft>
+                <a:spcPts val="800"/>
+              </a:spcAft>
+              <a:defRPr sz="1400"/>
+            </a:pPr>
+          </a:p>
+          <a:p>
+            <a:pPr>
+              <a:spcAft>
+                <a:spcPts val="800"/>
+              </a:spcAft>
+              <a:defRPr sz="1400"/>
+            </a:pPr>
+            <a:r>
+              <a:t>The leverage profile is weak and  constrains the rating through governance caps.</a:t>
+            </a:r>
+          </a:p>
+          <a:p>
+            <a:pPr>
+              <a:spcAft>
+                <a:spcPts val="800"/>
+              </a:spcAft>
+              <a:defRPr sz="1400"/>
+            </a:pPr>
+          </a:p>
+          <a:p>
+            <a:pPr>
+              <a:spcAft>
+                <a:spcPts val="800"/>
+              </a:spcAft>
+              <a:defRPr sz="1400"/>
+            </a:pPr>
+            <a:r>
+              <a:t>Key metrics:</a:t>
+            </a:r>
+          </a:p>
+          <a:p>
+            <a:pPr>
+              <a:spcAft>
+                <a:spcPts val="800"/>
+              </a:spcAft>
+              <a:defRPr sz="1400"/>
+            </a:pPr>
+            <a:r>
+              <a:t>- Net Debt Ex Leases: -8,083.00</a:t>
+            </a:r>
+          </a:p>
+          <a:p>
+            <a:pPr>
+              <a:spcAft>
+                <a:spcPts val="800"/>
+              </a:spcAft>
+              <a:defRPr sz="1400"/>
+            </a:pPr>
+            <a:r>
+              <a:t>- Net Debt Incl Leases: 35,033.00</a:t>
             </a:r>
           </a:p>
         </p:txBody>
@@ -3909,48 +5722,112 @@
       <p:grpSpPr/>
       <p:sp>
         <p:nvSpPr>
-          <p:cNvPr id="2" name="Title 1"/>
-          <p:cNvSpPr>
-            <a:spLocks noGrp="1"/>
-          </p:cNvSpPr>
-          <p:nvPr>
-            <p:ph type="title"/>
-          </p:nvPr>
-        </p:nvSpPr>
-        <p:spPr/>
-        <p:txBody>
-          <a:bodyPr/>
-          <a:lstStyle/>
-          <a:p>
-            <a:r>
-              <a:t>Recommendation</a:t>
-            </a:r>
-          </a:p>
-        </p:txBody>
-      </p:sp>
-      <p:sp>
-        <p:nvSpPr>
-          <p:cNvPr id="3" name="Content Placeholder 2"/>
-          <p:cNvSpPr>
-            <a:spLocks noGrp="1"/>
-          </p:cNvSpPr>
-          <p:nvPr>
-            <p:ph idx="1"/>
-          </p:nvPr>
-        </p:nvSpPr>
-        <p:spPr/>
-        <p:txBody>
-          <a:bodyPr/>
-          <a:lstStyle/>
-          <a:p>
-            <a:r>
-              <a:t>Recommendation: Maintain</a:t>
-            </a:r>
-          </a:p>
-          <a:p/>
-          <a:p>
-            <a:r>
-              <a:t>Key drivers: ebitda, net_debt_ex_leases, net_debt_incl_leases, interest_cover, net_debt_to_ebitda</a:t>
+          <p:cNvPr id="2" name="Rectangle 1"/>
+          <p:cNvSpPr/>
+          <p:nvPr/>
+        </p:nvSpPr>
+        <p:spPr>
+          <a:xfrm>
+            <a:off x="0" y="0"/>
+            <a:ext cx="12191695" cy="1097280"/>
+          </a:xfrm>
+          <a:prstGeom prst="rect">
+            <a:avLst/>
+          </a:prstGeom>
+          <a:solidFill>
+            <a:srgbClr val="1F4E79"/>
+          </a:solidFill>
+          <a:ln>
+            <a:noFill/>
+          </a:ln>
+        </p:spPr>
+        <p:style>
+          <a:lnRef idx="1">
+            <a:schemeClr val="accent1"/>
+          </a:lnRef>
+          <a:fillRef idx="3">
+            <a:schemeClr val="accent1"/>
+          </a:fillRef>
+          <a:effectRef idx="2">
+            <a:schemeClr val="accent1"/>
+          </a:effectRef>
+          <a:fontRef idx="minor">
+            <a:schemeClr val="lt1"/>
+          </a:fontRef>
+        </p:style>
+        <p:txBody>
+          <a:bodyPr rtlCol="0" anchor="ctr"/>
+          <a:lstStyle/>
+          <a:p>
+            <a:pPr algn="ctr"/>
+          </a:p>
+        </p:txBody>
+      </p:sp>
+      <p:sp>
+        <p:nvSpPr>
+          <p:cNvPr id="3" name="TextBox 2"/>
+          <p:cNvSpPr txBox="1"/>
+          <p:nvPr/>
+        </p:nvSpPr>
+        <p:spPr>
+          <a:xfrm>
+            <a:off x="457200" y="228600"/>
+            <a:ext cx="10972800" cy="731520"/>
+          </a:xfrm>
+          <a:prstGeom prst="rect">
+            <a:avLst/>
+          </a:prstGeom>
+          <a:noFill/>
+        </p:spPr>
+        <p:txBody>
+          <a:bodyPr wrap="none">
+            <a:spAutoFit/>
+          </a:bodyPr>
+          <a:lstStyle/>
+          <a:p>
+            <a:pPr>
+              <a:defRPr sz="2800" b="1">
+                <a:solidFill>
+                  <a:srgbClr val="FFFFFF"/>
+                </a:solidFill>
+              </a:defRPr>
+            </a:pPr>
+            <a:r>
+              <a:t>Key Risks</a:t>
+            </a:r>
+          </a:p>
+        </p:txBody>
+      </p:sp>
+      <p:sp>
+        <p:nvSpPr>
+          <p:cNvPr id="4" name="TextBox 3"/>
+          <p:cNvSpPr txBox="1"/>
+          <p:nvPr/>
+        </p:nvSpPr>
+        <p:spPr>
+          <a:xfrm>
+            <a:off x="548640" y="1371600"/>
+            <a:ext cx="10972800" cy="5029200"/>
+          </a:xfrm>
+          <a:prstGeom prst="rect">
+            <a:avLst/>
+          </a:prstGeom>
+          <a:noFill/>
+        </p:spPr>
+        <p:txBody>
+          <a:bodyPr wrap="square">
+            <a:spAutoFit/>
+          </a:bodyPr>
+          <a:lstStyle/>
+          <a:p>
+            <a:pPr>
+              <a:spcAft>
+                <a:spcPts val="800"/>
+              </a:spcAft>
+              <a:defRPr sz="1400"/>
+            </a:pPr>
+            <a:r>
+              <a:t>Impairment sensitivity disclosed: -10; Impairment sensitivity disclosed: -10; Going concern uncertainty: -20; A_reven...</a:t>
             </a:r>
           </a:p>
         </p:txBody>

</xml_diff>

<commit_message>
checkpoint before claude code
</commit_message>
<xml_diff>
--- a/test_results/pipeline_output/committee_deck.pptx
+++ b/test_results/pipeline_output/committee_deck.pptx
@@ -16,8 +16,6 @@
     <p:sldId id="264" r:id="rId15"/>
     <p:sldId id="265" r:id="rId16"/>
     <p:sldId id="266" r:id="rId17"/>
-    <p:sldId id="267" r:id="rId18"/>
-    <p:sldId id="268" r:id="rId19"/>
   </p:sldIdLst>
   <p:sldSz cx="12191695" cy="6858000" type="screen4x3"/>
   <p:notesSz cx="6858000" cy="9144000"/>
@@ -117,449 +115,6 @@
     </a:lvl9pPr>
   </p:defaultTextStyle>
 </p:presentation>
-</file>
-
-<file path=ppt/charts/chart1.xml><?xml version="1.0" encoding="utf-8"?>
-<c:chartSpace xmlns:c="http://schemas.openxmlformats.org/drawingml/2006/chart" xmlns:a="http://schemas.openxmlformats.org/drawingml/2006/main" xmlns:r="http://schemas.openxmlformats.org/officeDocument/2006/relationships">
-  <c:date1904 val="0"/>
-  <c:chart>
-    <c:autoTitleDeleted val="0"/>
-    <c:plotArea>
-      <c:barChart>
-        <c:barDir val="col"/>
-        <c:grouping val="clustered"/>
-        <c:ser>
-          <c:idx val="0"/>
-          <c:order val="0"/>
-          <c:tx>
-            <c:strRef>
-              <c:f>Sheet1!$B$1</c:f>
-              <c:strCache>
-                <c:ptCount val="1"/>
-                <c:pt idx="0">
-                  <c:v>Revenue (Rm)</c:v>
-                </c:pt>
-              </c:strCache>
-            </c:strRef>
-          </c:tx>
-          <c:cat>
-            <c:strRef>
-              <c:f>Sheet1!$A$2:$A$4</c:f>
-              <c:strCache>
-                <c:ptCount val="3"/>
-                <c:pt idx="0">
-                  <c:v>2023-06</c:v>
-                </c:pt>
-                <c:pt idx="1">
-                  <c:v>2024-06</c:v>
-                </c:pt>
-                <c:pt idx="2">
-                  <c:v>2025-06</c:v>
-                </c:pt>
-              </c:strCache>
-            </c:strRef>
-          </c:cat>
-          <c:val>
-            <c:numRef>
-              <c:f>Sheet1!$B$2:$B$4</c:f>
-              <c:numCache>
-                <c:formatCode>General</c:formatCode>
-                <c:ptCount val="3"/>
-                <c:pt idx="0">
-                  <c:v>214956.0</c:v>
-                </c:pt>
-                <c:pt idx="1">
-                  <c:v>232088.0</c:v>
-                </c:pt>
-                <c:pt idx="2">
-                  <c:v>252701.0</c:v>
-                </c:pt>
-              </c:numCache>
-            </c:numRef>
-          </c:val>
-        </c:ser>
-        <c:ser>
-          <c:idx val="1"/>
-          <c:order val="1"/>
-          <c:tx>
-            <c:strRef>
-              <c:f>Sheet1!$C$1</c:f>
-              <c:strCache>
-                <c:ptCount val="1"/>
-                <c:pt idx="0">
-                  <c:v>EBITDA (Rm)</c:v>
-                </c:pt>
-              </c:strCache>
-            </c:strRef>
-          </c:tx>
-          <c:cat>
-            <c:strRef>
-              <c:f>Sheet1!$A$2:$A$4</c:f>
-              <c:strCache>
-                <c:ptCount val="3"/>
-                <c:pt idx="0">
-                  <c:v>2023-06</c:v>
-                </c:pt>
-                <c:pt idx="1">
-                  <c:v>2024-06</c:v>
-                </c:pt>
-                <c:pt idx="2">
-                  <c:v>2025-06</c:v>
-                </c:pt>
-              </c:strCache>
-            </c:strRef>
-          </c:cat>
-          <c:val>
-            <c:numRef>
-              <c:f>Sheet1!$C$2:$C$4</c:f>
-              <c:numCache>
-                <c:formatCode>General</c:formatCode>
-                <c:ptCount val="3"/>
-                <c:pt idx="0">
-                  <c:v>6042.0</c:v>
-                </c:pt>
-                <c:pt idx="1">
-                  <c:v>5817.0</c:v>
-                </c:pt>
-                <c:pt idx="2">
-                  <c:v>6931.0</c:v>
-                </c:pt>
-              </c:numCache>
-            </c:numRef>
-          </c:val>
-        </c:ser>
-        <c:axId val="-2068027336"/>
-        <c:axId val="-2113994440"/>
-      </c:barChart>
-      <c:catAx>
-        <c:axId val="-2068027336"/>
-        <c:scaling>
-          <c:orientation val="minMax"/>
-        </c:scaling>
-        <c:delete val="0"/>
-        <c:axPos val="b"/>
-        <c:majorTickMark val="out"/>
-        <c:minorTickMark val="none"/>
-        <c:tickLblPos val="nextTo"/>
-        <c:crossAx val="-2113994440"/>
-        <c:crosses val="autoZero"/>
-        <c:auto val="1"/>
-        <c:lblAlgn val="ctr"/>
-        <c:lblOffset val="100"/>
-        <c:noMultiLvlLbl val="0"/>
-      </c:catAx>
-      <c:valAx>
-        <c:axId val="-2113994440"/>
-        <c:scaling/>
-        <c:delete val="0"/>
-        <c:axPos val="l"/>
-        <c:majorGridlines/>
-        <c:majorTickMark val="out"/>
-        <c:minorTickMark val="none"/>
-        <c:tickLblPos val="nextTo"/>
-        <c:crossAx val="-2068027336"/>
-        <c:crosses val="autoZero"/>
-      </c:valAx>
-    </c:plotArea>
-    <c:dispBlanksAs val="gap"/>
-  </c:chart>
-  <c:txPr>
-    <a:bodyPr/>
-    <a:lstStyle/>
-    <a:p>
-      <a:pPr>
-        <a:defRPr sz="1800"/>
-      </a:pPr>
-      <a:endParaRPr lang="en-US"/>
-    </a:p>
-  </c:txPr>
-  <c:externalData r:id="rId1">
-    <c:autoUpdate val="0"/>
-  </c:externalData>
-</c:chartSpace>
-</file>
-
-<file path=ppt/charts/chart2.xml><?xml version="1.0" encoding="utf-8"?>
-<c:chartSpace xmlns:c="http://schemas.openxmlformats.org/drawingml/2006/chart" xmlns:a="http://schemas.openxmlformats.org/drawingml/2006/main" xmlns:r="http://schemas.openxmlformats.org/officeDocument/2006/relationships">
-  <c:date1904 val="0"/>
-  <c:chart>
-    <c:autoTitleDeleted val="0"/>
-    <c:plotArea>
-      <c:lineChart>
-        <c:grouping val="standard"/>
-        <c:varyColors val="0"/>
-        <c:ser>
-          <c:idx val="0"/>
-          <c:order val="0"/>
-          <c:tx>
-            <c:strRef>
-              <c:f>Sheet1!$B$1</c:f>
-              <c:strCache>
-                <c:ptCount val="1"/>
-                <c:pt idx="0">
-                  <c:v>ND/EBITDA (x)</c:v>
-                </c:pt>
-              </c:strCache>
-            </c:strRef>
-          </c:tx>
-          <c:marker>
-            <c:symbol val="none"/>
-          </c:marker>
-          <c:cat>
-            <c:strRef>
-              <c:f>Sheet1!$A$2:$A$4</c:f>
-              <c:strCache>
-                <c:ptCount val="3"/>
-                <c:pt idx="0">
-                  <c:v>2023-06</c:v>
-                </c:pt>
-                <c:pt idx="1">
-                  <c:v>2024-06</c:v>
-                </c:pt>
-                <c:pt idx="2">
-                  <c:v>2025-06</c:v>
-                </c:pt>
-              </c:strCache>
-            </c:strRef>
-          </c:cat>
-          <c:val>
-            <c:numRef>
-              <c:f>Sheet1!$B$2:$B$4</c:f>
-              <c:numCache>
-                <c:formatCode>General</c:formatCode>
-                <c:ptCount val="3"/>
-                <c:pt idx="0">
-                  <c:v>4.3922542204568025</c:v>
-                </c:pt>
-                <c:pt idx="1">
-                  <c:v>4.790269898573148</c:v>
-                </c:pt>
-                <c:pt idx="2">
-                  <c:v>5.054537584764104</c:v>
-                </c:pt>
-              </c:numCache>
-            </c:numRef>
-          </c:val>
-          <c:smooth val="0"/>
-        </c:ser>
-        <c:marker val="1"/>
-        <c:smooth val="0"/>
-        <c:axId val="2118791784"/>
-        <c:axId val="2140495176"/>
-      </c:lineChart>
-      <c:catAx>
-        <c:axId val="2118791784"/>
-        <c:scaling>
-          <c:orientation val="minMax"/>
-        </c:scaling>
-        <c:delete val="0"/>
-        <c:axPos val="b"/>
-        <c:majorTickMark val="out"/>
-        <c:minorTickMark val="none"/>
-        <c:tickLblPos val="nextTo"/>
-        <c:crossAx val="2140495176"/>
-        <c:crosses val="autoZero"/>
-        <c:auto val="1"/>
-        <c:lblAlgn val="ctr"/>
-        <c:lblOffset val="100"/>
-        <c:noMultiLvlLbl val="0"/>
-      </c:catAx>
-      <c:valAx>
-        <c:axId val="2140495176"/>
-        <c:scaling/>
-        <c:delete val="0"/>
-        <c:axPos val="l"/>
-        <c:majorGridlines/>
-        <c:majorTickMark val="out"/>
-        <c:minorTickMark val="none"/>
-        <c:tickLblPos val="nextTo"/>
-        <c:crossAx val="2118791784"/>
-        <c:crosses val="autoZero"/>
-      </c:valAx>
-    </c:plotArea>
-    <c:legend>
-      <c:legendPos val="r"/>
-      <c:layout/>
-      <c:overlay val="0"/>
-    </c:legend>
-    <c:plotVisOnly val="1"/>
-    <c:dispBlanksAs val="gap"/>
-    <c:showDLblsOverMax val="0"/>
-  </c:chart>
-  <c:txPr>
-    <a:bodyPr/>
-    <a:lstStyle/>
-    <a:p>
-      <a:pPr>
-        <a:defRPr sz="1800"/>
-      </a:pPr>
-      <a:endParaRPr lang="en-US"/>
-    </a:p>
-  </c:txPr>
-  <c:externalData r:id="rId1">
-    <c:autoUpdate val="0"/>
-  </c:externalData>
-</c:chartSpace>
-</file>
-
-<file path=ppt/charts/chart3.xml><?xml version="1.0" encoding="utf-8"?>
-<c:chartSpace xmlns:c="http://schemas.openxmlformats.org/drawingml/2006/chart" xmlns:a="http://schemas.openxmlformats.org/drawingml/2006/main" xmlns:r="http://schemas.openxmlformats.org/officeDocument/2006/relationships">
-  <c:date1904 val="0"/>
-  <c:chart>
-    <c:autoTitleDeleted val="0"/>
-    <c:plotArea>
-      <c:barChart>
-        <c:barDir val="col"/>
-        <c:grouping val="clustered"/>
-        <c:ser>
-          <c:idx val="0"/>
-          <c:order val="0"/>
-          <c:tx>
-            <c:strRef>
-              <c:f>Sheet1!$B$1</c:f>
-              <c:strCache>
-                <c:ptCount val="1"/>
-                <c:pt idx="0">
-                  <c:v>Net CFO (Rm)</c:v>
-                </c:pt>
-              </c:strCache>
-            </c:strRef>
-          </c:tx>
-          <c:cat>
-            <c:strRef>
-              <c:f>Sheet1!$A$2:$A$4</c:f>
-              <c:strCache>
-                <c:ptCount val="3"/>
-                <c:pt idx="0">
-                  <c:v>2023-06</c:v>
-                </c:pt>
-                <c:pt idx="1">
-                  <c:v>2024-06</c:v>
-                </c:pt>
-                <c:pt idx="2">
-                  <c:v>2025-06</c:v>
-                </c:pt>
-              </c:strCache>
-            </c:strRef>
-          </c:cat>
-          <c:val>
-            <c:numRef>
-              <c:f>Sheet1!$B$2:$B$4</c:f>
-              <c:numCache>
-                <c:formatCode>General</c:formatCode>
-                <c:ptCount val="3"/>
-                <c:pt idx="0">
-                  <c:v>9831.0</c:v>
-                </c:pt>
-                <c:pt idx="1">
-                  <c:v>13841.0</c:v>
-                </c:pt>
-                <c:pt idx="2">
-                  <c:v>10984.0</c:v>
-                </c:pt>
-              </c:numCache>
-            </c:numRef>
-          </c:val>
-        </c:ser>
-        <c:ser>
-          <c:idx val="1"/>
-          <c:order val="1"/>
-          <c:tx>
-            <c:strRef>
-              <c:f>Sheet1!$C$1</c:f>
-              <c:strCache>
-                <c:ptCount val="1"/>
-                <c:pt idx="0">
-                  <c:v>Capex (Rm)</c:v>
-                </c:pt>
-              </c:strCache>
-            </c:strRef>
-          </c:tx>
-          <c:cat>
-            <c:strRef>
-              <c:f>Sheet1!$A$2:$A$4</c:f>
-              <c:strCache>
-                <c:ptCount val="3"/>
-                <c:pt idx="0">
-                  <c:v>2023-06</c:v>
-                </c:pt>
-                <c:pt idx="1">
-                  <c:v>2024-06</c:v>
-                </c:pt>
-                <c:pt idx="2">
-                  <c:v>2025-06</c:v>
-                </c:pt>
-              </c:strCache>
-            </c:strRef>
-          </c:cat>
-          <c:val>
-            <c:numRef>
-              <c:f>Sheet1!$C$2:$C$4</c:f>
-              <c:numCache>
-                <c:formatCode>General</c:formatCode>
-                <c:ptCount val="3"/>
-                <c:pt idx="0">
-                  <c:v>4594.0</c:v>
-                </c:pt>
-                <c:pt idx="1">
-                  <c:v>5718.0</c:v>
-                </c:pt>
-                <c:pt idx="2">
-                  <c:v>6320.0</c:v>
-                </c:pt>
-              </c:numCache>
-            </c:numRef>
-          </c:val>
-        </c:ser>
-        <c:axId val="-2068027336"/>
-        <c:axId val="-2113994440"/>
-      </c:barChart>
-      <c:catAx>
-        <c:axId val="-2068027336"/>
-        <c:scaling>
-          <c:orientation val="minMax"/>
-        </c:scaling>
-        <c:delete val="0"/>
-        <c:axPos val="b"/>
-        <c:majorTickMark val="out"/>
-        <c:minorTickMark val="none"/>
-        <c:tickLblPos val="nextTo"/>
-        <c:crossAx val="-2113994440"/>
-        <c:crosses val="autoZero"/>
-        <c:auto val="1"/>
-        <c:lblAlgn val="ctr"/>
-        <c:lblOffset val="100"/>
-        <c:noMultiLvlLbl val="0"/>
-      </c:catAx>
-      <c:valAx>
-        <c:axId val="-2113994440"/>
-        <c:scaling/>
-        <c:delete val="0"/>
-        <c:axPos val="l"/>
-        <c:majorGridlines/>
-        <c:majorTickMark val="out"/>
-        <c:minorTickMark val="none"/>
-        <c:tickLblPos val="nextTo"/>
-        <c:crossAx val="-2068027336"/>
-        <c:crosses val="autoZero"/>
-      </c:valAx>
-    </c:plotArea>
-    <c:dispBlanksAs val="gap"/>
-  </c:chart>
-  <c:txPr>
-    <a:bodyPr/>
-    <a:lstStyle/>
-    <a:p>
-      <a:pPr>
-        <a:defRPr sz="1800"/>
-      </a:pPr>
-      <a:endParaRPr lang="en-US"/>
-    </a:p>
-  </c:txPr>
-  <c:externalData r:id="rId1">
-    <c:autoUpdate val="0"/>
-  </c:externalData>
-</c:chartSpace>
 </file>
 
 <file path=ppt/slideLayouts/slideLayout1.xml><?xml version="1.0" encoding="utf-8"?>
@@ -3545,14 +3100,57 @@
       <p:grpSpPr/>
       <p:sp>
         <p:nvSpPr>
-          <p:cNvPr id="2" name="TextBox 1"/>
+          <p:cNvPr id="2" name="Rectangle 1"/>
+          <p:cNvSpPr/>
+          <p:nvPr/>
+        </p:nvSpPr>
+        <p:spPr>
+          <a:xfrm>
+            <a:off x="0" y="0"/>
+            <a:ext cx="12191695" cy="1097280"/>
+          </a:xfrm>
+          <a:prstGeom prst="rect">
+            <a:avLst/>
+          </a:prstGeom>
+          <a:solidFill>
+            <a:srgbClr val="1F4E79"/>
+          </a:solidFill>
+          <a:ln>
+            <a:noFill/>
+          </a:ln>
+        </p:spPr>
+        <p:style>
+          <a:lnRef idx="1">
+            <a:schemeClr val="accent1"/>
+          </a:lnRef>
+          <a:fillRef idx="3">
+            <a:schemeClr val="accent1"/>
+          </a:fillRef>
+          <a:effectRef idx="2">
+            <a:schemeClr val="accent1"/>
+          </a:effectRef>
+          <a:fontRef idx="minor">
+            <a:schemeClr val="lt1"/>
+          </a:fontRef>
+        </p:style>
+        <p:txBody>
+          <a:bodyPr rtlCol="0" anchor="ctr"/>
+          <a:lstStyle/>
+          <a:p>
+            <a:pPr algn="ctr"/>
+          </a:p>
+        </p:txBody>
+      </p:sp>
+      <p:sp>
+        <p:nvSpPr>
+          <p:cNvPr id="3" name="TextBox 2"/>
           <p:cNvSpPr txBox="1"/>
           <p:nvPr/>
         </p:nvSpPr>
         <p:spPr>
           <a:xfrm>
-            <a:off x="457200" y="2011680"/>
-            <a:ext cx="11247120" cy="1097280"/>
+            <a:off x="457200" y="228600"/>
+            <a:ext cx="10972800" cy="731520"/>
           </a:xfrm>
           <a:prstGeom prst="rect">
             <a:avLst/>
@@ -3566,28 +3164,28 @@
           <a:lstStyle/>
           <a:p>
             <a:pPr>
-              <a:defRPr sz="4000" b="1">
+              <a:defRPr sz="2800" b="1">
                 <a:solidFill>
-                  <a:srgbClr val="1F4E79"/>
+                  <a:srgbClr val="FFFFFF"/>
                 </a:solidFill>
               </a:defRPr>
             </a:pPr>
             <a:r>
-              <a:t>Credit Committee</a:t>
-            </a:r>
-          </a:p>
-        </p:txBody>
-      </p:sp>
-      <p:sp>
-        <p:nvSpPr>
-          <p:cNvPr id="3" name="TextBox 2"/>
+              <a:t>Deal Overview</a:t>
+            </a:r>
+          </a:p>
+        </p:txBody>
+      </p:sp>
+      <p:sp>
+        <p:nvSpPr>
+          <p:cNvPr id="4" name="TextBox 3"/>
           <p:cNvSpPr txBox="1"/>
           <p:nvPr/>
         </p:nvSpPr>
         <p:spPr>
           <a:xfrm>
-            <a:off x="457200" y="3291840"/>
-            <a:ext cx="11247120" cy="914400"/>
+            <a:off x="548640" y="1371600"/>
+            <a:ext cx="10972800" cy="5029200"/>
           </a:xfrm>
           <a:prstGeom prst="rect">
             <a:avLst/>
@@ -3595,20 +3193,85 @@
           <a:noFill/>
         </p:spPr>
         <p:txBody>
-          <a:bodyPr wrap="none">
+          <a:bodyPr wrap="square">
             <a:spAutoFit/>
           </a:bodyPr>
           <a:lstStyle/>
           <a:p>
             <a:pPr>
-              <a:defRPr sz="1800">
-                <a:solidFill>
-                  <a:srgbClr val="2E75B6"/>
-                </a:solidFill>
-              </a:defRPr>
-            </a:pPr>
-            <a:r>
-              <a:t>Sample (Pty) Ltd  •  Rating: BBB  •  Recommendation: Caution  •  v0aca3bd4</a:t>
+              <a:spcAft>
+                <a:spcPts val="800"/>
+              </a:spcAft>
+              <a:defRPr sz="1400"/>
+            </a:pPr>
+            <a:r>
+              <a:t>Borrower: Sample (Pty) Ltd</a:t>
+            </a:r>
+          </a:p>
+          <a:p>
+            <a:pPr>
+              <a:spcAft>
+                <a:spcPts val="800"/>
+              </a:spcAft>
+              <a:defRPr sz="1400"/>
+            </a:pPr>
+            <a:r>
+              <a:t>Sector: FMCG / Retail</a:t>
+            </a:r>
+          </a:p>
+          <a:p>
+            <a:pPr>
+              <a:spcAft>
+                <a:spcPts val="800"/>
+              </a:spcAft>
+              <a:defRPr sz="1400"/>
+            </a:pPr>
+            <a:r>
+              <a:t>Facility type: Annual Review Facility</a:t>
+            </a:r>
+          </a:p>
+          <a:p>
+            <a:pPr>
+              <a:spcAft>
+                <a:spcPts val="800"/>
+              </a:spcAft>
+              <a:defRPr sz="1400"/>
+            </a:pPr>
+            <a:r>
+              <a:t>Exposure amount: 35,033.00</a:t>
+            </a:r>
+          </a:p>
+          <a:p>
+            <a:pPr>
+              <a:spcAft>
+                <a:spcPts val="800"/>
+              </a:spcAft>
+              <a:defRPr sz="1400"/>
+            </a:pPr>
+            <a:r>
+              <a:t>Security summary: See Security &amp; Collateral section</a:t>
+            </a:r>
+          </a:p>
+          <a:p>
+            <a:pPr>
+              <a:spcAft>
+                <a:spcPts val="800"/>
+              </a:spcAft>
+              <a:defRPr sz="1400"/>
+            </a:pPr>
+            <a:r>
+              <a:t>Internal rating: BBB</a:t>
+            </a:r>
+          </a:p>
+          <a:p>
+            <a:pPr>
+              <a:spcAft>
+                <a:spcPts val="800"/>
+              </a:spcAft>
+              <a:defRPr sz="1400"/>
+            </a:pPr>
+            <a:r>
+              <a:t>Recommendation: Caution</a:t>
             </a:r>
           </a:p>
         </p:txBody>
@@ -3704,7 +3367,7 @@
               </a:defRPr>
             </a:pPr>
             <a:r>
-              <a:t>Stress Testing Results</a:t>
+              <a:t>Rating Summary</a:t>
             </a:r>
           </a:p>
         </p:txBody>
@@ -3738,7 +3401,7 @@
               <a:defRPr sz="1400"/>
             </a:pPr>
             <a:r>
-              <a:t>A_revenue_minus_10pct: Interest cover 2.63x ND/EBITDA 5.62x</a:t>
+              <a:t>Quantitative score: See scorecard</a:t>
             </a:r>
           </a:p>
           <a:p>
@@ -3749,7 +3412,7 @@
               <a:defRPr sz="1400"/>
             </a:pPr>
             <a:r>
-              <a:t>B_interest_plus_200bps: Interest cover 2.90x</a:t>
+              <a:t>Qualitative overlay: See scorecard / commentary</a:t>
             </a:r>
           </a:p>
           <a:p>
@@ -3760,7 +3423,7 @@
               <a:defRPr sz="1400"/>
             </a:pPr>
             <a:r>
-              <a:t>C_working_capital_shock: Cash after shock: -15,324.10</a:t>
+              <a:t>Final internal rating: BBB</a:t>
             </a:r>
           </a:p>
           <a:p>
@@ -3771,7 +3434,7 @@
               <a:defRPr sz="1400"/>
             </a:pPr>
             <a:r>
-              <a:t>D_margin_compression_200bps: Interest cover 0.79x ND/EBITDA 18.66x</a:t>
+              <a:t>Probability of default (PD): 0.80%</a:t>
             </a:r>
           </a:p>
           <a:p>
@@ -3782,42 +3445,59 @@
               <a:defRPr sz="1400"/>
             </a:pPr>
             <a:r>
-              <a:t>E_combined: Interest cover 2.61x ND/EBITDA 5.62x</a:t>
-            </a:r>
-          </a:p>
-        </p:txBody>
-      </p:sp>
-      <p:sp>
-        <p:nvSpPr>
-          <p:cNvPr id="5" name="TextBox 4"/>
-          <p:cNvSpPr txBox="1"/>
-          <p:nvPr/>
-        </p:nvSpPr>
-        <p:spPr>
-          <a:xfrm>
-            <a:off x="548640" y="5303520"/>
-            <a:ext cx="10972800" cy="731520"/>
-          </a:xfrm>
-          <a:prstGeom prst="rect">
-            <a:avLst/>
-          </a:prstGeom>
-          <a:noFill/>
-        </p:spPr>
-        <p:txBody>
-          <a:bodyPr wrap="none">
-            <a:spAutoFit/>
-          </a:bodyPr>
-          <a:lstStyle/>
-          <a:p>
-            <a:pPr>
-              <a:defRPr sz="1200" i="1">
-                <a:solidFill>
-                  <a:srgbClr val="2E75B6"/>
-                </a:solidFill>
-              </a:defRPr>
-            </a:pPr>
-            <a:r>
-              <a:t>► Breaches under stress trigger governance notch downgrades.</a:t>
+              <a:t>Loss given default (LGD): 53.73%</a:t>
+            </a:r>
+          </a:p>
+          <a:p>
+            <a:pPr>
+              <a:spcAft>
+                <a:spcPts val="800"/>
+              </a:spcAft>
+              <a:defRPr sz="1400"/>
+            </a:pPr>
+            <a:r>
+              <a:t>Exposure at default (EAD): 35,033.00</a:t>
+            </a:r>
+          </a:p>
+          <a:p>
+            <a:pPr>
+              <a:spcAft>
+                <a:spcPts val="800"/>
+              </a:spcAft>
+              <a:defRPr sz="1400"/>
+            </a:pPr>
+            <a:r>
+              <a:t>Expected loss (EL): 150.59</a:t>
+            </a:r>
+          </a:p>
+          <a:p>
+            <a:pPr>
+              <a:spcAft>
+                <a:spcPts val="800"/>
+              </a:spcAft>
+              <a:defRPr sz="1400"/>
+            </a:pPr>
+            <a:r>
+              <a:t>Outlook: Stable</a:t>
+            </a:r>
+          </a:p>
+          <a:p>
+            <a:pPr>
+              <a:spcAft>
+                <a:spcPts val="800"/>
+              </a:spcAft>
+              <a:defRPr sz="1400"/>
+            </a:pPr>
+          </a:p>
+          <a:p>
+            <a:pPr>
+              <a:spcAft>
+                <a:spcPts val="800"/>
+              </a:spcAft>
+              <a:defRPr sz="1400"/>
+            </a:pPr>
+            <a:r>
+              <a:t>The internal rating of Sample (Pty) Ltd at BBB reflects a balance between adequate business risk and significant fina...</a:t>
             </a:r>
           </a:p>
         </p:txBody>
@@ -3913,7 +3593,7 @@
               </a:defRPr>
             </a:pPr>
             <a:r>
-              <a:t>Covenants &amp; Headroom</a:t>
+              <a:t>Recommendation</a:t>
             </a:r>
           </a:p>
         </p:txBody>
@@ -3947,7 +3627,7 @@
               <a:defRPr sz="1400"/>
             </a:pPr>
             <a:r>
-              <a:t>Covenants &amp; Headroom — Score: 10.0/100, Rating: Weak</a:t>
+              <a:t>Decision: Caution</a:t>
             </a:r>
           </a:p>
           <a:p>
@@ -3966,7 +3646,7 @@
               <a:defRPr sz="1400"/>
             </a:pPr>
             <a:r>
-              <a:t>Covenant terms: max leverage 2.8x, min interest cover 3.5x.  Current metrics indicate covenant breach.</a:t>
+              <a:t>Conditions precedent:</a:t>
             </a:r>
           </a:p>
           <a:p>
@@ -3976,6 +3656,9 @@
               </a:spcAft>
               <a:defRPr sz="1400"/>
             </a:pPr>
+            <a:r>
+              <a:t>The recommendation for Sample (Pty) Ltd is to proceed with caution, subject to specific conditions:</a:t>
+            </a:r>
           </a:p>
           <a:p>
             <a:pPr>
@@ -3985,7 +3668,7 @@
               <a:defRPr sz="1400"/>
             </a:pPr>
             <a:r>
-              <a:t>Leverage headroom: -83.6% to covenant limit.  Interest cover headroom: -61.7%.</a:t>
+              <a:t>- Monitor covenant breaches closely and engage early with lenders to explore potential remedies or waivers.</a:t>
             </a:r>
           </a:p>
           <a:p>
@@ -3995,6 +3678,9 @@
               </a:spcAft>
               <a:defRPr sz="1400"/>
             </a:pPr>
+            <a:r>
+              <a:t>- Monitor leverage (net debt to EBITDA) quarterly, ensuring it remains within acceptable limits to avoid further cove...</a:t>
+            </a:r>
           </a:p>
           <a:p>
             <a:pPr>
@@ -4003,9 +3689,6 @@
               </a:spcAft>
               <a:defRPr sz="1400"/>
             </a:pPr>
-            <a:r>
-              <a:t>Breach triggers rating cap under governance (max BB-).</a:t>
-            </a:r>
           </a:p>
           <a:p>
             <a:pPr>
@@ -4014,6 +3697,9 @@
               </a:spcAft>
               <a:defRPr sz="1400"/>
             </a:pPr>
+            <a:r>
+              <a:t>Monitoring requirements:</a:t>
+            </a:r>
           </a:p>
           <a:p>
             <a:pPr>
@@ -4023,7 +3709,7 @@
               <a:defRPr sz="1400"/>
             </a:pPr>
             <a:r>
-              <a:t>Refer to Note 48 (borrowings) and Note 43.4.3 for covenant terms and cure rights.</a:t>
+              <a:t>The monitoring plan for Sample (Pty) Ltd includes:</a:t>
             </a:r>
           </a:p>
           <a:p>
@@ -4033,6 +3719,9 @@
               </a:spcAft>
               <a:defRPr sz="1400"/>
             </a:pPr>
+            <a:r>
+              <a:t>- Quarterly reviews of financial performance, focusing on liquidity and leverage metrics.</a:t>
+            </a:r>
           </a:p>
           <a:p>
             <a:pPr>
@@ -4042,7 +3731,7 @@
               <a:defRPr sz="1400"/>
             </a:pPr>
             <a:r>
-              <a:t>Covenant headroom is weak and directly influences the final rating where breach applies.</a:t>
+              <a:t>- Regular engagement with lenders to address covenant breaches and explore potential waivers or amendments.</a:t>
             </a:r>
           </a:p>
           <a:p>
@@ -4052,6 +3741,9 @@
               </a:spcAft>
               <a:defRPr sz="1400"/>
             </a:pPr>
+            <a:r>
+              <a:t>- Continuous assessment of stress testing results to identify emerging risks and develop mitigation strategies.</a:t>
+            </a:r>
           </a:p>
           <a:p>
             <a:pPr>
@@ -4061,308 +3753,7 @@
               <a:defRPr sz="1400"/>
             </a:pPr>
             <a:r>
-              <a:t>Key metrics:</a:t>
-            </a:r>
-          </a:p>
-          <a:p>
-            <a:pPr>
-              <a:spcAft>
-                <a:spcPts val="800"/>
-              </a:spcAft>
-              <a:defRPr sz="1400"/>
-            </a:pPr>
-            <a:r>
-              <a:t>- Coverage Headroom Pct: -61.70</a:t>
-            </a:r>
-          </a:p>
-          <a:p>
-            <a:pPr>
-              <a:spcAft>
-                <a:spcPts val="800"/>
-              </a:spcAft>
-              <a:defRPr sz="1400"/>
-            </a:pPr>
-            <a:r>
-              <a:t>- Leverage Headroom Pct: -83.60</a:t>
-            </a:r>
-          </a:p>
-        </p:txBody>
-      </p:sp>
-    </p:spTree>
-  </p:cSld>
-  <p:clrMapOvr>
-    <a:masterClrMapping/>
-  </p:clrMapOvr>
-</p:sld>
-</file>
-
-<file path=ppt/slides/slide12.xml><?xml version="1.0" encoding="utf-8"?>
-<p:sld xmlns:a="http://schemas.openxmlformats.org/drawingml/2006/main" xmlns:p="http://schemas.openxmlformats.org/presentationml/2006/main" xmlns:r="http://schemas.openxmlformats.org/officeDocument/2006/relationships">
-  <p:cSld>
-    <p:spTree>
-      <p:nvGrpSpPr>
-        <p:cNvPr id="1" name=""/>
-        <p:cNvGrpSpPr/>
-        <p:nvPr/>
-      </p:nvGrpSpPr>
-      <p:grpSpPr/>
-      <p:sp>
-        <p:nvSpPr>
-          <p:cNvPr id="2" name="Rectangle 1"/>
-          <p:cNvSpPr/>
-          <p:nvPr/>
-        </p:nvSpPr>
-        <p:spPr>
-          <a:xfrm>
-            <a:off x="0" y="0"/>
-            <a:ext cx="12191695" cy="1097280"/>
-          </a:xfrm>
-          <a:prstGeom prst="rect">
-            <a:avLst/>
-          </a:prstGeom>
-          <a:solidFill>
-            <a:srgbClr val="1F4E79"/>
-          </a:solidFill>
-          <a:ln>
-            <a:noFill/>
-          </a:ln>
-        </p:spPr>
-        <p:style>
-          <a:lnRef idx="1">
-            <a:schemeClr val="accent1"/>
-          </a:lnRef>
-          <a:fillRef idx="3">
-            <a:schemeClr val="accent1"/>
-          </a:fillRef>
-          <a:effectRef idx="2">
-            <a:schemeClr val="accent1"/>
-          </a:effectRef>
-          <a:fontRef idx="minor">
-            <a:schemeClr val="lt1"/>
-          </a:fontRef>
-        </p:style>
-        <p:txBody>
-          <a:bodyPr rtlCol="0" anchor="ctr"/>
-          <a:lstStyle/>
-          <a:p>
-            <a:pPr algn="ctr"/>
-          </a:p>
-        </p:txBody>
-      </p:sp>
-      <p:sp>
-        <p:nvSpPr>
-          <p:cNvPr id="3" name="TextBox 2"/>
-          <p:cNvSpPr txBox="1"/>
-          <p:nvPr/>
-        </p:nvSpPr>
-        <p:spPr>
-          <a:xfrm>
-            <a:off x="457200" y="228600"/>
-            <a:ext cx="10972800" cy="731520"/>
-          </a:xfrm>
-          <a:prstGeom prst="rect">
-            <a:avLst/>
-          </a:prstGeom>
-          <a:noFill/>
-        </p:spPr>
-        <p:txBody>
-          <a:bodyPr wrap="none">
-            <a:spAutoFit/>
-          </a:bodyPr>
-          <a:lstStyle/>
-          <a:p>
-            <a:pPr>
-              <a:defRPr sz="2800" b="1">
-                <a:solidFill>
-                  <a:srgbClr val="FFFFFF"/>
-                </a:solidFill>
-              </a:defRPr>
-            </a:pPr>
-            <a:r>
-              <a:t>Internal Rating Rationale</a:t>
-            </a:r>
-          </a:p>
-        </p:txBody>
-      </p:sp>
-      <p:sp>
-        <p:nvSpPr>
-          <p:cNvPr id="4" name="TextBox 3"/>
-          <p:cNvSpPr txBox="1"/>
-          <p:nvPr/>
-        </p:nvSpPr>
-        <p:spPr>
-          <a:xfrm>
-            <a:off x="548640" y="1371600"/>
-            <a:ext cx="10972800" cy="5029200"/>
-          </a:xfrm>
-          <a:prstGeom prst="rect">
-            <a:avLst/>
-          </a:prstGeom>
-          <a:noFill/>
-        </p:spPr>
-        <p:txBody>
-          <a:bodyPr wrap="square">
-            <a:spAutoFit/>
-          </a:bodyPr>
-          <a:lstStyle/>
-          <a:p>
-            <a:pPr>
-              <a:spcAft>
-                <a:spcPts val="800"/>
-              </a:spcAft>
-              <a:defRPr sz="1400"/>
-            </a:pPr>
-            <a:r>
-              <a:t>Internal rating: BBB. Aggregate score: 48.1/100. Top positive drivers: Business Risk (Adequate), Financial Performanc...</a:t>
-            </a:r>
-          </a:p>
-        </p:txBody>
-      </p:sp>
-    </p:spTree>
-  </p:cSld>
-  <p:clrMapOvr>
-    <a:masterClrMapping/>
-  </p:clrMapOvr>
-</p:sld>
-</file>
-
-<file path=ppt/slides/slide13.xml><?xml version="1.0" encoding="utf-8"?>
-<p:sld xmlns:a="http://schemas.openxmlformats.org/drawingml/2006/main" xmlns:p="http://schemas.openxmlformats.org/presentationml/2006/main" xmlns:r="http://schemas.openxmlformats.org/officeDocument/2006/relationships">
-  <p:cSld>
-    <p:spTree>
-      <p:nvGrpSpPr>
-        <p:cNvPr id="1" name=""/>
-        <p:cNvGrpSpPr/>
-        <p:nvPr/>
-      </p:nvGrpSpPr>
-      <p:grpSpPr/>
-      <p:sp>
-        <p:nvSpPr>
-          <p:cNvPr id="2" name="Rectangle 1"/>
-          <p:cNvSpPr/>
-          <p:nvPr/>
-        </p:nvSpPr>
-        <p:spPr>
-          <a:xfrm>
-            <a:off x="0" y="0"/>
-            <a:ext cx="12191695" cy="1097280"/>
-          </a:xfrm>
-          <a:prstGeom prst="rect">
-            <a:avLst/>
-          </a:prstGeom>
-          <a:solidFill>
-            <a:srgbClr val="1F4E79"/>
-          </a:solidFill>
-          <a:ln>
-            <a:noFill/>
-          </a:ln>
-        </p:spPr>
-        <p:style>
-          <a:lnRef idx="1">
-            <a:schemeClr val="accent1"/>
-          </a:lnRef>
-          <a:fillRef idx="3">
-            <a:schemeClr val="accent1"/>
-          </a:fillRef>
-          <a:effectRef idx="2">
-            <a:schemeClr val="accent1"/>
-          </a:effectRef>
-          <a:fontRef idx="minor">
-            <a:schemeClr val="lt1"/>
-          </a:fontRef>
-        </p:style>
-        <p:txBody>
-          <a:bodyPr rtlCol="0" anchor="ctr"/>
-          <a:lstStyle/>
-          <a:p>
-            <a:pPr algn="ctr"/>
-          </a:p>
-        </p:txBody>
-      </p:sp>
-      <p:sp>
-        <p:nvSpPr>
-          <p:cNvPr id="3" name="TextBox 2"/>
-          <p:cNvSpPr txBox="1"/>
-          <p:nvPr/>
-        </p:nvSpPr>
-        <p:spPr>
-          <a:xfrm>
-            <a:off x="457200" y="228600"/>
-            <a:ext cx="10972800" cy="731520"/>
-          </a:xfrm>
-          <a:prstGeom prst="rect">
-            <a:avLst/>
-          </a:prstGeom>
-          <a:noFill/>
-        </p:spPr>
-        <p:txBody>
-          <a:bodyPr wrap="none">
-            <a:spAutoFit/>
-          </a:bodyPr>
-          <a:lstStyle/>
-          <a:p>
-            <a:pPr>
-              <a:defRPr sz="2800" b="1">
-                <a:solidFill>
-                  <a:srgbClr val="FFFFFF"/>
-                </a:solidFill>
-              </a:defRPr>
-            </a:pPr>
-            <a:r>
-              <a:t>Recommendation</a:t>
-            </a:r>
-          </a:p>
-        </p:txBody>
-      </p:sp>
-      <p:sp>
-        <p:nvSpPr>
-          <p:cNvPr id="4" name="TextBox 3"/>
-          <p:cNvSpPr txBox="1"/>
-          <p:nvPr/>
-        </p:nvSpPr>
-        <p:spPr>
-          <a:xfrm>
-            <a:off x="548640" y="1371600"/>
-            <a:ext cx="10972800" cy="5029200"/>
-          </a:xfrm>
-          <a:prstGeom prst="rect">
-            <a:avLst/>
-          </a:prstGeom>
-          <a:noFill/>
-        </p:spPr>
-        <p:txBody>
-          <a:bodyPr wrap="square">
-            <a:spAutoFit/>
-          </a:bodyPr>
-          <a:lstStyle/>
-          <a:p>
-            <a:pPr>
-              <a:spcAft>
-                <a:spcPts val="800"/>
-              </a:spcAft>
-              <a:defRPr sz="1400"/>
-            </a:pPr>
-            <a:r>
-              <a:t>Recommendation: Caution</a:t>
-            </a:r>
-          </a:p>
-          <a:p>
-            <a:pPr>
-              <a:spcAft>
-                <a:spcPts val="800"/>
-              </a:spcAft>
-              <a:defRPr sz="1400"/>
-            </a:pPr>
-          </a:p>
-          <a:p>
-            <a:pPr>
-              <a:spcAft>
-                <a:spcPts val="800"/>
-              </a:spcAft>
-              <a:defRPr sz="1400"/>
-            </a:pPr>
-            <a:r>
-              <a:t>Key drivers monitored: net_debt_ex_leases, ebitda, net_debt_incl_leases, interest_cover, net_debt_to_ebitda</a:t>
+              <a:t>- Ongoing evaluation of accounting disclosures to ensure transparency and compliance with IFRS standards.</a:t>
             </a:r>
           </a:p>
         </p:txBody>
@@ -4492,140 +3883,7 @@
               <a:defRPr sz="1400"/>
             </a:pPr>
             <a:r>
-              <a:t>This credit review covers Sample (Pty) Ltd for the period ending 2025-06-29.</a:t>
-            </a:r>
-          </a:p>
-          <a:p>
-            <a:pPr>
-              <a:spcAft>
-                <a:spcPts val="800"/>
-              </a:spcAft>
-              <a:defRPr sz="1400"/>
-            </a:pPr>
-          </a:p>
-          <a:p>
-            <a:pPr>
-              <a:spcAft>
-                <a:spcPts val="800"/>
-              </a:spcAft>
-              <a:defRPr sz="1400"/>
-            </a:pPr>
-            <a:r>
-              <a:t>Internal rating: BBB. Recommendation: Caution.</a:t>
-            </a:r>
-          </a:p>
-          <a:p>
-            <a:pPr>
-              <a:spcAft>
-                <a:spcPts val="800"/>
-              </a:spcAft>
-              <a:defRPr sz="1400"/>
-            </a:pPr>
-          </a:p>
-          <a:p>
-            <a:pPr>
-              <a:spcAft>
-                <a:spcPts val="800"/>
-              </a:spcAft>
-              <a:defRPr sz="1400"/>
-            </a:pPr>
-            <a:r>
-              <a:t>• Business Risk: Adequate (64.2/100)</a:t>
-            </a:r>
-          </a:p>
-          <a:p>
-            <a:pPr>
-              <a:spcAft>
-                <a:spcPts val="800"/>
-              </a:spcAft>
-              <a:defRPr sz="1400"/>
-            </a:pPr>
-          </a:p>
-          <a:p>
-            <a:pPr>
-              <a:spcAft>
-                <a:spcPts val="800"/>
-              </a:spcAft>
-              <a:defRPr sz="1400"/>
-            </a:pPr>
-            <a:r>
-              <a:t>• Financial Performance: Adequate (62.2/100)</a:t>
-            </a:r>
-          </a:p>
-          <a:p>
-            <a:pPr>
-              <a:spcAft>
-                <a:spcPts val="800"/>
-              </a:spcAft>
-              <a:defRPr sz="1400"/>
-            </a:pPr>
-          </a:p>
-          <a:p>
-            <a:pPr>
-              <a:spcAft>
-                <a:spcPts val="800"/>
-              </a:spcAft>
-              <a:defRPr sz="1400"/>
-            </a:pPr>
-            <a:r>
-              <a:t>• Liquidity: Weak (40.0/100)</a:t>
-            </a:r>
-          </a:p>
-          <a:p>
-            <a:pPr>
-              <a:spcAft>
-                <a:spcPts val="800"/>
-              </a:spcAft>
-              <a:defRPr sz="1400"/>
-            </a:pPr>
-          </a:p>
-          <a:p>
-            <a:pPr>
-              <a:spcAft>
-                <a:spcPts val="800"/>
-              </a:spcAft>
-              <a:defRPr sz="1400"/>
-            </a:pPr>
-            <a:r>
-              <a:t>• Leverage: Weak (22.5/100)</a:t>
-            </a:r>
-          </a:p>
-          <a:p>
-            <a:pPr>
-              <a:spcAft>
-                <a:spcPts val="800"/>
-              </a:spcAft>
-              <a:defRPr sz="1400"/>
-            </a:pPr>
-          </a:p>
-          <a:p>
-            <a:pPr>
-              <a:spcAft>
-                <a:spcPts val="800"/>
-              </a:spcAft>
-              <a:defRPr sz="1400"/>
-            </a:pPr>
-            <a:r>
-              <a:t>• Accounting Quality: Weak (40.0/100)</a:t>
-            </a:r>
-          </a:p>
-          <a:p>
-            <a:pPr>
-              <a:spcAft>
-                <a:spcPts val="800"/>
-              </a:spcAft>
-              <a:defRPr sz="1400"/>
-            </a:pPr>
-          </a:p>
-          <a:p>
-            <a:pPr>
-              <a:spcAft>
-                <a:spcPts val="800"/>
-              </a:spcAft>
-              <a:defRPr sz="1400"/>
-            </a:pPr>
-            <a:r>
-              <a:t>Revenue growth: 8.9% YoY.</a:t>
+              <a:t>Sample (Pty) Ltd's credit profile is currently rated at BBB, with a recommendation of caution due to several financia...</a:t>
             </a:r>
           </a:p>
         </p:txBody>
@@ -4660,7 +3918,7 @@
               </a:defRPr>
             </a:pPr>
             <a:r>
-              <a:t>► Key risks and mitigants are detailed in the sections below.</a:t>
+              <a:t>► Trajectory and watchpoints for committee decision.</a:t>
             </a:r>
           </a:p>
         </p:txBody>
@@ -4685,14 +3943,57 @@
       <p:grpSpPr/>
       <p:sp>
         <p:nvSpPr>
-          <p:cNvPr id="2" name="TextBox 1"/>
+          <p:cNvPr id="2" name="Rectangle 1"/>
+          <p:cNvSpPr/>
+          <p:nvPr/>
+        </p:nvSpPr>
+        <p:spPr>
+          <a:xfrm>
+            <a:off x="0" y="0"/>
+            <a:ext cx="12191695" cy="1097280"/>
+          </a:xfrm>
+          <a:prstGeom prst="rect">
+            <a:avLst/>
+          </a:prstGeom>
+          <a:solidFill>
+            <a:srgbClr val="1F4E79"/>
+          </a:solidFill>
+          <a:ln>
+            <a:noFill/>
+          </a:ln>
+        </p:spPr>
+        <p:style>
+          <a:lnRef idx="1">
+            <a:schemeClr val="accent1"/>
+          </a:lnRef>
+          <a:fillRef idx="3">
+            <a:schemeClr val="accent1"/>
+          </a:fillRef>
+          <a:effectRef idx="2">
+            <a:schemeClr val="accent1"/>
+          </a:effectRef>
+          <a:fontRef idx="minor">
+            <a:schemeClr val="lt1"/>
+          </a:fontRef>
+        </p:style>
+        <p:txBody>
+          <a:bodyPr rtlCol="0" anchor="ctr"/>
+          <a:lstStyle/>
+          <a:p>
+            <a:pPr algn="ctr"/>
+          </a:p>
+        </p:txBody>
+      </p:sp>
+      <p:sp>
+        <p:nvSpPr>
+          <p:cNvPr id="3" name="TextBox 2"/>
           <p:cNvSpPr txBox="1"/>
           <p:nvPr/>
         </p:nvSpPr>
         <p:spPr>
           <a:xfrm>
-            <a:off x="457200" y="182880"/>
-            <a:ext cx="10972800" cy="457200"/>
+            <a:off x="457200" y="228600"/>
+            <a:ext cx="10972800" cy="731520"/>
           </a:xfrm>
           <a:prstGeom prst="rect">
             <a:avLst/>
@@ -4706,32 +4007,71 @@
           <a:lstStyle/>
           <a:p>
             <a:pPr>
-              <a:defRPr b="1"/>
-            </a:pPr>
-            <a:r>
-              <a:t>Revenue &amp; EBITDA Trend</a:t>
-            </a:r>
-          </a:p>
-        </p:txBody>
-      </p:sp>
-      <p:graphicFrame>
-        <p:nvGraphicFramePr>
-          <p:cNvPr id="3" name="Chart 2"/>
-          <p:cNvGraphicFramePr>
-            <a:graphicFrameLocks noGrp="1"/>
-          </p:cNvGraphicFramePr>
+              <a:defRPr sz="2800" b="1">
+                <a:solidFill>
+                  <a:srgbClr val="FFFFFF"/>
+                </a:solidFill>
+              </a:defRPr>
+            </a:pPr>
+            <a:r>
+              <a:t>Business Overview</a:t>
+            </a:r>
+          </a:p>
+        </p:txBody>
+      </p:sp>
+      <p:sp>
+        <p:nvSpPr>
+          <p:cNvPr id="4" name="TextBox 3"/>
+          <p:cNvSpPr txBox="1"/>
           <p:nvPr/>
-        </p:nvGraphicFramePr>
-        <p:xfrm>
-          <a:off x="457200" y="640080"/>
-          <a:ext cx="10972800" cy="5303520"/>
-        </p:xfrm>
-        <a:graphic>
-          <a:graphicData uri="http://schemas.openxmlformats.org/drawingml/2006/chart">
-            <c:chart xmlns:c="http://schemas.openxmlformats.org/drawingml/2006/chart" r:id="rId2"/>
-          </a:graphicData>
-        </a:graphic>
-      </p:graphicFrame>
+        </p:nvSpPr>
+        <p:spPr>
+          <a:xfrm>
+            <a:off x="548640" y="1371600"/>
+            <a:ext cx="10972800" cy="5029200"/>
+          </a:xfrm>
+          <a:prstGeom prst="rect">
+            <a:avLst/>
+          </a:prstGeom>
+          <a:noFill/>
+        </p:spPr>
+        <p:txBody>
+          <a:bodyPr wrap="square">
+            <a:spAutoFit/>
+          </a:bodyPr>
+          <a:lstStyle/>
+          <a:p>
+            <a:pPr>
+              <a:spcAft>
+                <a:spcPts val="800"/>
+              </a:spcAft>
+              <a:defRPr sz="1400"/>
+            </a:pPr>
+            <a:r>
+              <a:t>Sample (Pty) Ltd operates across 10 segments, contributing to a diversified revenue stream of 252,701.00, which grew ...</a:t>
+            </a:r>
+          </a:p>
+          <a:p>
+            <a:pPr>
+              <a:spcAft>
+                <a:spcPts val="800"/>
+              </a:spcAft>
+              <a:defRPr sz="1400"/>
+            </a:pPr>
+          </a:p>
+          <a:p>
+            <a:pPr>
+              <a:spcAft>
+                <a:spcPts val="800"/>
+              </a:spcAft>
+              <a:defRPr sz="1400"/>
+            </a:pPr>
+            <a:r>
+              <a:t>EBITDA margin of 2.7%. Revenue growth 8.9% YoY indicates market positioning.</a:t>
+            </a:r>
+          </a:p>
+        </p:txBody>
+      </p:sp>
     </p:spTree>
   </p:cSld>
   <p:clrMapOvr>
@@ -4752,14 +4092,57 @@
       <p:grpSpPr/>
       <p:sp>
         <p:nvSpPr>
-          <p:cNvPr id="2" name="TextBox 1"/>
+          <p:cNvPr id="2" name="Rectangle 1"/>
+          <p:cNvSpPr/>
+          <p:nvPr/>
+        </p:nvSpPr>
+        <p:spPr>
+          <a:xfrm>
+            <a:off x="0" y="0"/>
+            <a:ext cx="12191695" cy="1097280"/>
+          </a:xfrm>
+          <a:prstGeom prst="rect">
+            <a:avLst/>
+          </a:prstGeom>
+          <a:solidFill>
+            <a:srgbClr val="1F4E79"/>
+          </a:solidFill>
+          <a:ln>
+            <a:noFill/>
+          </a:ln>
+        </p:spPr>
+        <p:style>
+          <a:lnRef idx="1">
+            <a:schemeClr val="accent1"/>
+          </a:lnRef>
+          <a:fillRef idx="3">
+            <a:schemeClr val="accent1"/>
+          </a:fillRef>
+          <a:effectRef idx="2">
+            <a:schemeClr val="accent1"/>
+          </a:effectRef>
+          <a:fontRef idx="minor">
+            <a:schemeClr val="lt1"/>
+          </a:fontRef>
+        </p:style>
+        <p:txBody>
+          <a:bodyPr rtlCol="0" anchor="ctr"/>
+          <a:lstStyle/>
+          <a:p>
+            <a:pPr algn="ctr"/>
+          </a:p>
+        </p:txBody>
+      </p:sp>
+      <p:sp>
+        <p:nvSpPr>
+          <p:cNvPr id="3" name="TextBox 2"/>
           <p:cNvSpPr txBox="1"/>
           <p:nvPr/>
         </p:nvSpPr>
         <p:spPr>
           <a:xfrm>
-            <a:off x="457200" y="182880"/>
-            <a:ext cx="10972800" cy="457200"/>
+            <a:off x="457200" y="228600"/>
+            <a:ext cx="10972800" cy="731520"/>
           </a:xfrm>
           <a:prstGeom prst="rect">
             <a:avLst/>
@@ -4773,32 +4156,52 @@
           <a:lstStyle/>
           <a:p>
             <a:pPr>
-              <a:defRPr b="1"/>
-            </a:pPr>
-            <a:r>
-              <a:t>ND/EBITDA Trend</a:t>
-            </a:r>
-          </a:p>
-        </p:txBody>
-      </p:sp>
-      <p:graphicFrame>
-        <p:nvGraphicFramePr>
-          <p:cNvPr id="3" name="Chart 2"/>
-          <p:cNvGraphicFramePr>
-            <a:graphicFrameLocks noGrp="1"/>
-          </p:cNvGraphicFramePr>
+              <a:defRPr sz="2800" b="1">
+                <a:solidFill>
+                  <a:srgbClr val="FFFFFF"/>
+                </a:solidFill>
+              </a:defRPr>
+            </a:pPr>
+            <a:r>
+              <a:t>Industry Overview</a:t>
+            </a:r>
+          </a:p>
+        </p:txBody>
+      </p:sp>
+      <p:sp>
+        <p:nvSpPr>
+          <p:cNvPr id="4" name="TextBox 3"/>
+          <p:cNvSpPr txBox="1"/>
           <p:nvPr/>
-        </p:nvGraphicFramePr>
-        <p:xfrm>
-          <a:off x="457200" y="640080"/>
-          <a:ext cx="10972800" cy="5303520"/>
-        </p:xfrm>
-        <a:graphic>
-          <a:graphicData uri="http://schemas.openxmlformats.org/drawingml/2006/chart">
-            <c:chart xmlns:c="http://schemas.openxmlformats.org/drawingml/2006/chart" r:id="rId2"/>
-          </a:graphicData>
-        </a:graphic>
-      </p:graphicFrame>
+        </p:nvSpPr>
+        <p:spPr>
+          <a:xfrm>
+            <a:off x="548640" y="1371600"/>
+            <a:ext cx="10972800" cy="5029200"/>
+          </a:xfrm>
+          <a:prstGeom prst="rect">
+            <a:avLst/>
+          </a:prstGeom>
+          <a:noFill/>
+        </p:spPr>
+        <p:txBody>
+          <a:bodyPr wrap="square">
+            <a:spAutoFit/>
+          </a:bodyPr>
+          <a:lstStyle/>
+          <a:p>
+            <a:pPr>
+              <a:spcAft>
+                <a:spcPts val="800"/>
+              </a:spcAft>
+              <a:defRPr sz="1400"/>
+            </a:pPr>
+            <a:r>
+              <a:t>Company operates across 10 business segments.</a:t>
+            </a:r>
+          </a:p>
+        </p:txBody>
+      </p:sp>
     </p:spTree>
   </p:cSld>
   <p:clrMapOvr>
@@ -4819,14 +4222,57 @@
       <p:grpSpPr/>
       <p:sp>
         <p:nvSpPr>
-          <p:cNvPr id="2" name="TextBox 1"/>
+          <p:cNvPr id="2" name="Rectangle 1"/>
+          <p:cNvSpPr/>
+          <p:nvPr/>
+        </p:nvSpPr>
+        <p:spPr>
+          <a:xfrm>
+            <a:off x="0" y="0"/>
+            <a:ext cx="12191695" cy="1097280"/>
+          </a:xfrm>
+          <a:prstGeom prst="rect">
+            <a:avLst/>
+          </a:prstGeom>
+          <a:solidFill>
+            <a:srgbClr val="1F4E79"/>
+          </a:solidFill>
+          <a:ln>
+            <a:noFill/>
+          </a:ln>
+        </p:spPr>
+        <p:style>
+          <a:lnRef idx="1">
+            <a:schemeClr val="accent1"/>
+          </a:lnRef>
+          <a:fillRef idx="3">
+            <a:schemeClr val="accent1"/>
+          </a:fillRef>
+          <a:effectRef idx="2">
+            <a:schemeClr val="accent1"/>
+          </a:effectRef>
+          <a:fontRef idx="minor">
+            <a:schemeClr val="lt1"/>
+          </a:fontRef>
+        </p:style>
+        <p:txBody>
+          <a:bodyPr rtlCol="0" anchor="ctr"/>
+          <a:lstStyle/>
+          <a:p>
+            <a:pPr algn="ctr"/>
+          </a:p>
+        </p:txBody>
+      </p:sp>
+      <p:sp>
+        <p:nvSpPr>
+          <p:cNvPr id="3" name="TextBox 2"/>
           <p:cNvSpPr txBox="1"/>
           <p:nvPr/>
         </p:nvSpPr>
         <p:spPr>
           <a:xfrm>
-            <a:off x="457200" y="182880"/>
-            <a:ext cx="10972800" cy="457200"/>
+            <a:off x="457200" y="228600"/>
+            <a:ext cx="10972800" cy="731520"/>
           </a:xfrm>
           <a:prstGeom prst="rect">
             <a:avLst/>
@@ -4840,32 +4286,52 @@
           <a:lstStyle/>
           <a:p>
             <a:pPr>
-              <a:defRPr b="1"/>
-            </a:pPr>
-            <a:r>
-              <a:t>CFO vs Capex</a:t>
-            </a:r>
-          </a:p>
-        </p:txBody>
-      </p:sp>
-      <p:graphicFrame>
-        <p:nvGraphicFramePr>
-          <p:cNvPr id="3" name="Chart 2"/>
-          <p:cNvGraphicFramePr>
-            <a:graphicFrameLocks noGrp="1"/>
-          </p:cNvGraphicFramePr>
+              <a:defRPr sz="2800" b="1">
+                <a:solidFill>
+                  <a:srgbClr val="FFFFFF"/>
+                </a:solidFill>
+              </a:defRPr>
+            </a:pPr>
+            <a:r>
+              <a:t>Income Statement Performance</a:t>
+            </a:r>
+          </a:p>
+        </p:txBody>
+      </p:sp>
+      <p:sp>
+        <p:nvSpPr>
+          <p:cNvPr id="4" name="TextBox 3"/>
+          <p:cNvSpPr txBox="1"/>
           <p:nvPr/>
-        </p:nvGraphicFramePr>
-        <p:xfrm>
-          <a:off x="457200" y="640080"/>
-          <a:ext cx="10972800" cy="5303520"/>
-        </p:xfrm>
-        <a:graphic>
-          <a:graphicData uri="http://schemas.openxmlformats.org/drawingml/2006/chart">
-            <c:chart xmlns:c="http://schemas.openxmlformats.org/drawingml/2006/chart" r:id="rId2"/>
-          </a:graphicData>
-        </a:graphic>
-      </p:graphicFrame>
+        </p:nvSpPr>
+        <p:spPr>
+          <a:xfrm>
+            <a:off x="548640" y="1371600"/>
+            <a:ext cx="10972800" cy="5029200"/>
+          </a:xfrm>
+          <a:prstGeom prst="rect">
+            <a:avLst/>
+          </a:prstGeom>
+          <a:noFill/>
+        </p:spPr>
+        <p:txBody>
+          <a:bodyPr wrap="square">
+            <a:spAutoFit/>
+          </a:bodyPr>
+          <a:lstStyle/>
+          <a:p>
+            <a:pPr>
+              <a:spcAft>
+                <a:spcPts val="800"/>
+              </a:spcAft>
+              <a:defRPr sz="1400"/>
+            </a:pPr>
+            <a:r>
+              <a:t>The financial performance of Sample (Pty) Ltd is rated as adequate, with revenue growth of 8.9% and EBITDA growth of ...</a:t>
+            </a:r>
+          </a:p>
+        </p:txBody>
+      </p:sp>
     </p:spTree>
   </p:cSld>
   <p:clrMapOvr>
@@ -4957,7 +4423,7 @@
               </a:defRPr>
             </a:pPr>
             <a:r>
-              <a:t>Financial Performance</a:t>
+              <a:t>Cash Flow Analysis</a:t>
             </a:r>
           </a:p>
         </p:txBody>
@@ -4991,146 +4457,7 @@
               <a:defRPr sz="1400"/>
             </a:pPr>
             <a:r>
-              <a:t>3-Year Financial Summary:</a:t>
-            </a:r>
-          </a:p>
-          <a:p>
-            <a:pPr>
-              <a:spcAft>
-                <a:spcPts val="800"/>
-              </a:spcAft>
-              <a:defRPr sz="1400"/>
-            </a:pPr>
-            <a:r>
-              <a:t>Period | Revenue | EBITDA | EBITDA % | Net Debt | ND/EBITDA | Interest Cover</a:t>
-            </a:r>
-          </a:p>
-          <a:p>
-            <a:pPr>
-              <a:spcAft>
-                <a:spcPts val="800"/>
-              </a:spcAft>
-              <a:defRPr sz="1400"/>
-            </a:pPr>
-            <a:r>
-              <a:t>2025-06-30 | 252,701.00 | 6,931.00 | 2.7% | 35,033.00 | 5.05x | 2.92x</a:t>
-            </a:r>
-          </a:p>
-          <a:p>
-            <a:pPr>
-              <a:spcAft>
-                <a:spcPts val="800"/>
-              </a:spcAft>
-              <a:defRPr sz="1400"/>
-            </a:pPr>
-            <a:r>
-              <a:t>2024-06-30 | 232,088.00 | 5,817.00 | 2.5% | 27,865.00 | 4.79x | 3.05x</a:t>
-            </a:r>
-          </a:p>
-          <a:p>
-            <a:pPr>
-              <a:spcAft>
-                <a:spcPts val="800"/>
-              </a:spcAft>
-              <a:defRPr sz="1400"/>
-            </a:pPr>
-            <a:r>
-              <a:t>2023-06-30 | 214,956.00 | 6,042.00 | 2.8% | 26,538.00 | 4.39x | 3.37x</a:t>
-            </a:r>
-          </a:p>
-          <a:p>
-            <a:pPr>
-              <a:spcAft>
-                <a:spcPts val="800"/>
-              </a:spcAft>
-              <a:defRPr sz="1400"/>
-            </a:pPr>
-          </a:p>
-          <a:p>
-            <a:pPr>
-              <a:spcAft>
-                <a:spcPts val="800"/>
-              </a:spcAft>
-              <a:defRPr sz="1400"/>
-            </a:pPr>
-            <a:r>
-              <a:t>Financial Performance Analysis — Score: 62.2/100, Rating: Adequate</a:t>
-            </a:r>
-          </a:p>
-          <a:p>
-            <a:pPr>
-              <a:spcAft>
-                <a:spcPts val="800"/>
-              </a:spcAft>
-              <a:defRPr sz="1400"/>
-            </a:pPr>
-          </a:p>
-          <a:p>
-            <a:pPr>
-              <a:spcAft>
-                <a:spcPts val="800"/>
-              </a:spcAft>
-              <a:defRPr sz="1400"/>
-            </a:pPr>
-            <a:r>
-              <a:t>Revenue of 252,701.00  grew 8.9% YoY .  EBITDA margin is 2.7%.</a:t>
-            </a:r>
-          </a:p>
-          <a:p>
-            <a:pPr>
-              <a:spcAft>
-                <a:spcPts val="800"/>
-              </a:spcAft>
-              <a:defRPr sz="1400"/>
-            </a:pPr>
-          </a:p>
-          <a:p>
-            <a:pPr>
-              <a:spcAft>
-                <a:spcPts val="800"/>
-              </a:spcAft>
-              <a:defRPr sz="1400"/>
-            </a:pPr>
-            <a:r>
-              <a:t>CFO/EBITDA of 1.58x indicates strong cash conversion from earnings.  FCF conversion supports debt service capacity.</a:t>
-            </a:r>
-          </a:p>
-          <a:p>
-            <a:pPr>
-              <a:spcAft>
-                <a:spcPts val="800"/>
-              </a:spcAft>
-              <a:defRPr sz="1400"/>
-            </a:pPr>
-          </a:p>
-          <a:p>
-            <a:pPr>
-              <a:spcAft>
-                <a:spcPts val="800"/>
-              </a:spcAft>
-              <a:defRPr sz="1400"/>
-            </a:pPr>
-            <a:r>
-              <a:t>EBITDA margin of 2.7% reflects operating efficiency and pricing power.</a:t>
-            </a:r>
-          </a:p>
-          <a:p>
-            <a:pPr>
-              <a:spcAft>
-                <a:spcPts val="800"/>
-              </a:spcAft>
-              <a:defRPr sz="1400"/>
-            </a:pPr>
-          </a:p>
-          <a:p>
-            <a:pPr>
-              <a:spcAft>
-                <a:spcPts val="800"/>
-              </a:spcAft>
-              <a:defRPr sz="1400"/>
-            </a:pPr>
-            <a:r>
-              <a:t>Revenue concentration and cyclicality are assessed in the business risk section.</a:t>
+              <a:t>The liquidity position of Sample (Pty) Ltd is weak, with a current ratio of 0.89 and a quick ratio of 0.23, indicatin...</a:t>
             </a:r>
           </a:p>
         </p:txBody>
@@ -5226,7 +4553,7 @@
               </a:defRPr>
             </a:pPr>
             <a:r>
-              <a:t>Cash Flow &amp; Liquidity</a:t>
+              <a:t>Balance Sheet &amp; Leverage</a:t>
             </a:r>
           </a:p>
         </p:txBody>
@@ -5260,178 +4587,7 @@
               <a:defRPr sz="1400"/>
             </a:pPr>
             <a:r>
-              <a:t>Cash Flow &amp; Liquidity — Score: 40.0/100, Rating: Weak</a:t>
-            </a:r>
-          </a:p>
-          <a:p>
-            <a:pPr>
-              <a:spcAft>
-                <a:spcPts val="800"/>
-              </a:spcAft>
-              <a:defRPr sz="1400"/>
-            </a:pPr>
-          </a:p>
-          <a:p>
-            <a:pPr>
-              <a:spcAft>
-                <a:spcPts val="800"/>
-              </a:spcAft>
-              <a:defRPr sz="1400"/>
-            </a:pPr>
-            <a:r>
-              <a:t>12-month forward liquidity coverage (sources/uses) is 0.21x.  Liquidity surplus over 12 months: -77,275.02.</a:t>
-            </a:r>
-          </a:p>
-          <a:p>
-            <a:pPr>
-              <a:spcAft>
-                <a:spcPts val="800"/>
-              </a:spcAft>
-              <a:defRPr sz="1400"/>
-            </a:pPr>
-          </a:p>
-          <a:p>
-            <a:pPr>
-              <a:spcAft>
-                <a:spcPts val="800"/>
-              </a:spcAft>
-              <a:defRPr sz="1400"/>
-            </a:pPr>
-            <a:r>
-              <a:t>Opening cash of 9,946.00 against ST debt of 44,979.00  implies reliance on undrawn facilities or operating cash flow ...</a:t>
-            </a:r>
-          </a:p>
-          <a:p>
-            <a:pPr>
-              <a:spcAft>
-                <a:spcPts val="800"/>
-              </a:spcAft>
-              <a:defRPr sz="1400"/>
-            </a:pPr>
-          </a:p>
-          <a:p>
-            <a:pPr>
-              <a:spcAft>
-                <a:spcPts val="800"/>
-              </a:spcAft>
-              <a:defRPr sz="1400"/>
-            </a:pPr>
-            <a:r>
-              <a:t>Liquidity is critical; sources are insufficient to cover 12-month uses.</a:t>
-            </a:r>
-          </a:p>
-          <a:p>
-            <a:pPr>
-              <a:spcAft>
-                <a:spcPts val="800"/>
-              </a:spcAft>
-              <a:defRPr sz="1400"/>
-            </a:pPr>
-          </a:p>
-          <a:p>
-            <a:pPr>
-              <a:spcAft>
-                <a:spcPts val="800"/>
-              </a:spcAft>
-              <a:defRPr sz="1400"/>
-            </a:pPr>
-            <a:r>
-              <a:t>Current ratio below 1.0x indicates short-term obligations exceed liquid assets.</a:t>
-            </a:r>
-          </a:p>
-          <a:p>
-            <a:pPr>
-              <a:spcAft>
-                <a:spcPts val="800"/>
-              </a:spcAft>
-              <a:defRPr sz="1400"/>
-            </a:pPr>
-          </a:p>
-          <a:p>
-            <a:pPr>
-              <a:spcAft>
-                <a:spcPts val="800"/>
-              </a:spcAft>
-              <a:defRPr sz="1400"/>
-            </a:pPr>
-            <a:r>
-              <a:t>The liquidity profile is weak and influences the rating through governance caps where applicable.</a:t>
-            </a:r>
-          </a:p>
-          <a:p>
-            <a:pPr>
-              <a:spcAft>
-                <a:spcPts val="800"/>
-              </a:spcAft>
-              <a:defRPr sz="1400"/>
-            </a:pPr>
-          </a:p>
-          <a:p>
-            <a:pPr>
-              <a:spcAft>
-                <a:spcPts val="800"/>
-              </a:spcAft>
-              <a:defRPr sz="1400"/>
-            </a:pPr>
-            <a:r>
-              <a:t>Key metrics:</a:t>
-            </a:r>
-          </a:p>
-          <a:p>
-            <a:pPr>
-              <a:spcAft>
-                <a:spcPts val="800"/>
-              </a:spcAft>
-              <a:defRPr sz="1400"/>
-            </a:pPr>
-            <a:r>
-              <a:t>- Current Ratio: 0.89</a:t>
-            </a:r>
-          </a:p>
-          <a:p>
-            <a:pPr>
-              <a:spcAft>
-                <a:spcPts val="800"/>
-              </a:spcAft>
-              <a:defRPr sz="1400"/>
-            </a:pPr>
-            <a:r>
-              <a:t>- Liquidity Coverage Ratio: 0.21</a:t>
-            </a:r>
-          </a:p>
-        </p:txBody>
-      </p:sp>
-      <p:sp>
-        <p:nvSpPr>
-          <p:cNvPr id="5" name="TextBox 4"/>
-          <p:cNvSpPr txBox="1"/>
-          <p:nvPr/>
-        </p:nvSpPr>
-        <p:spPr>
-          <a:xfrm>
-            <a:off x="548640" y="5303520"/>
-            <a:ext cx="10972800" cy="731520"/>
-          </a:xfrm>
-          <a:prstGeom prst="rect">
-            <a:avLst/>
-          </a:prstGeom>
-          <a:noFill/>
-        </p:spPr>
-        <p:txBody>
-          <a:bodyPr wrap="none">
-            <a:spAutoFit/>
-          </a:bodyPr>
-          <a:lstStyle/>
-          <a:p>
-            <a:pPr>
-              <a:defRPr sz="1200" i="1">
-                <a:solidFill>
-                  <a:srgbClr val="2E75B6"/>
-                </a:solidFill>
-              </a:defRPr>
-            </a:pPr>
-            <a:r>
-              <a:t>► 12-month forward liquidity model.</a:t>
+              <a:t>Sample (Pty) Ltd's leverage profile is concerning, with a net debt to EBITDA ratio of 5.05x, indicating high financia...</a:t>
             </a:r>
           </a:p>
         </p:txBody>
@@ -5527,7 +4683,7 @@
               </a:defRPr>
             </a:pPr>
             <a:r>
-              <a:t>Balance Sheet &amp; Leverage</a:t>
+              <a:t>Liquidity Position</a:t>
             </a:r>
           </a:p>
         </p:txBody>
@@ -5561,7 +4717,7 @@
               <a:defRPr sz="1400"/>
             </a:pPr>
             <a:r>
-              <a:t>Leverage &amp; Capital Structure — Score: 22.5/100, Rating: Weak</a:t>
+              <a:t>Cash on hand: 9,946.00</a:t>
             </a:r>
           </a:p>
           <a:p>
@@ -5571,6 +4727,9 @@
               </a:spcAft>
               <a:defRPr sz="1400"/>
             </a:pPr>
+            <a:r>
+              <a:t>Current ratio: 20.773078906652913</a:t>
+            </a:r>
           </a:p>
           <a:p>
             <a:pPr>
@@ -5580,7 +4739,7 @@
               <a:defRPr sz="1400"/>
             </a:pPr>
             <a:r>
-              <a:t>Net debt/EBITDA (incl. leases) is 5.05x , increasing from 4.79x in the prior period.  Interest cover stands at 1.34x.</a:t>
+              <a:t>Quick ratio: N/A</a:t>
             </a:r>
           </a:p>
           <a:p>
@@ -5590,6 +4749,9 @@
               </a:spcAft>
               <a:defRPr sz="1400"/>
             </a:pPr>
+            <a:r>
+              <a:t>Undrawn facilities: 0.00</a:t>
+            </a:r>
           </a:p>
           <a:p>
             <a:pPr>
@@ -5598,9 +4760,6 @@
               </a:spcAft>
               <a:defRPr sz="1400"/>
             </a:pPr>
-            <a:r>
-              <a:t>The increase in leverage reflects  higher debt and/or lower EBITDA.  Net debt ex-leases is negative (cash exceeds deb...</a:t>
-            </a:r>
           </a:p>
           <a:p>
             <a:pPr>
@@ -5609,95 +4768,8 @@
               </a:spcAft>
               <a:defRPr sz="1400"/>
             </a:pPr>
-          </a:p>
-          <a:p>
-            <a:pPr>
-              <a:spcAft>
-                <a:spcPts val="800"/>
-              </a:spcAft>
-              <a:defRPr sz="1400"/>
-            </a:pPr>
-            <a:r>
-              <a:t>Leverage of 5.05x is  structurally elevated and inconsistent with investment-grade metrics.</a:t>
-            </a:r>
-          </a:p>
-          <a:p>
-            <a:pPr>
-              <a:spcAft>
-                <a:spcPts val="800"/>
-              </a:spcAft>
-              <a:defRPr sz="1400"/>
-            </a:pPr>
-          </a:p>
-          <a:p>
-            <a:pPr>
-              <a:spcAft>
-                <a:spcPts val="800"/>
-              </a:spcAft>
-              <a:defRPr sz="1400"/>
-            </a:pPr>
-            <a:r>
-              <a:t>Current leverage exceeds covenant threshold of 2.8x, indicating breach risk.  Under a 10% revenue stress scenario lev...</a:t>
-            </a:r>
-          </a:p>
-          <a:p>
-            <a:pPr>
-              <a:spcAft>
-                <a:spcPts val="800"/>
-              </a:spcAft>
-              <a:defRPr sz="1400"/>
-            </a:pPr>
-          </a:p>
-          <a:p>
-            <a:pPr>
-              <a:spcAft>
-                <a:spcPts val="800"/>
-              </a:spcAft>
-              <a:defRPr sz="1400"/>
-            </a:pPr>
-            <a:r>
-              <a:t>The leverage profile is weak and  constrains the rating through governance caps.</a:t>
-            </a:r>
-          </a:p>
-          <a:p>
-            <a:pPr>
-              <a:spcAft>
-                <a:spcPts val="800"/>
-              </a:spcAft>
-              <a:defRPr sz="1400"/>
-            </a:pPr>
-          </a:p>
-          <a:p>
-            <a:pPr>
-              <a:spcAft>
-                <a:spcPts val="800"/>
-              </a:spcAft>
-              <a:defRPr sz="1400"/>
-            </a:pPr>
-            <a:r>
-              <a:t>Key metrics:</a:t>
-            </a:r>
-          </a:p>
-          <a:p>
-            <a:pPr>
-              <a:spcAft>
-                <a:spcPts val="800"/>
-              </a:spcAft>
-              <a:defRPr sz="1400"/>
-            </a:pPr>
-            <a:r>
-              <a:t>- Net Debt Ex Leases: -8,083.00</a:t>
-            </a:r>
-          </a:p>
-          <a:p>
-            <a:pPr>
-              <a:spcAft>
-                <a:spcPts val="800"/>
-              </a:spcAft>
-              <a:defRPr sz="1400"/>
-            </a:pPr>
-            <a:r>
-              <a:t>- Net Debt Incl Leases: 35,033.00</a:t>
+            <a:r>
+              <a:t>The liquidity position of Sample (Pty) Ltd is weak, with a current ratio of 0.89 and a quick ratio of 0.23, indicatin...</a:t>
             </a:r>
           </a:p>
         </p:txBody>
@@ -5793,7 +4865,7 @@
               </a:defRPr>
             </a:pPr>
             <a:r>
-              <a:t>Key Risks</a:t>
+              <a:t>Risk Matrix</a:t>
             </a:r>
           </a:p>
         </p:txBody>
@@ -5827,7 +4899,18 @@
               <a:defRPr sz="1400"/>
             </a:pPr>
             <a:r>
-              <a:t>Impairment sensitivity disclosed: -10; Impairment sensitivity disclosed: -10; Going concern uncertainty: -20; A_reven...</a:t>
+              <a:t>Risk | Severity | Trend | Mitigant</a:t>
+            </a:r>
+          </a:p>
+          <a:p>
+            <a:pPr>
+              <a:spcAft>
+                <a:spcPts val="800"/>
+              </a:spcAft>
+              <a:defRPr sz="1400"/>
+            </a:pPr>
+            <a:r>
+              <a:t>- Key risks for Sample (Pty) Ltd include high financial leverage, weak liquidity, and covenant br | Severity: High | ...</a:t>
             </a:r>
           </a:p>
         </p:txBody>

</xml_diff>